<commit_message>
Fix slide 8 graph label
</commit_message>
<xml_diff>
--- a/Weather and Crime Data Analysis Presentation.pptx
+++ b/Weather and Crime Data Analysis Presentation.pptx
@@ -4913,6 +4913,60 @@
           </a:prstGeom>
         </p:spPr>
       </p:pic>
+      <p:sp>
+        <p:nvSpPr>
+          <p:cNvPr id="3" name="Rectangle 2">
+            <a:extLst>
+              <a:ext uri="{FF2B5EF4-FFF2-40B4-BE49-F238E27FC236}">
+                <a16:creationId xmlns:a16="http://schemas.microsoft.com/office/drawing/2014/main" id="{6BCF0038-16FE-4456-8F0D-B96341EA5130}"/>
+              </a:ext>
+            </a:extLst>
+          </p:cNvPr>
+          <p:cNvSpPr/>
+          <p:nvPr/>
+        </p:nvSpPr>
+        <p:spPr>
+          <a:xfrm>
+            <a:off x="3794078" y="2647666"/>
+            <a:ext cx="3900299" cy="177421"/>
+          </a:xfrm>
+          <a:prstGeom prst="rect">
+            <a:avLst/>
+          </a:prstGeom>
+          <a:solidFill>
+            <a:schemeClr val="bg1"/>
+          </a:solidFill>
+          <a:ln>
+            <a:solidFill>
+              <a:schemeClr val="bg1"/>
+            </a:solidFill>
+          </a:ln>
+        </p:spPr>
+        <p:style>
+          <a:lnRef idx="2">
+            <a:schemeClr val="accent1">
+              <a:shade val="50000"/>
+            </a:schemeClr>
+          </a:lnRef>
+          <a:fillRef idx="1">
+            <a:schemeClr val="accent1"/>
+          </a:fillRef>
+          <a:effectRef idx="0">
+            <a:schemeClr val="accent1"/>
+          </a:effectRef>
+          <a:fontRef idx="minor">
+            <a:schemeClr val="lt1"/>
+          </a:fontRef>
+        </p:style>
+        <p:txBody>
+          <a:bodyPr rtlCol="0" anchor="ctr"/>
+          <a:lstStyle/>
+          <a:p>
+            <a:pPr algn="ctr"/>
+            <a:endParaRPr lang="en-US"/>
+          </a:p>
+        </p:txBody>
+      </p:sp>
     </p:spTree>
     <p:extLst>
       <p:ext uri="{BB962C8B-B14F-4D97-AF65-F5344CB8AC3E}">

</xml_diff>

<commit_message>
Update ppt with label fixes
</commit_message>
<xml_diff>
--- a/Weather and Crime Data Analysis Presentation.pptx
+++ b/Weather and Crime Data Analysis Presentation.pptx
@@ -119,7 +119,7 @@
   </p:defaultTextStyle>
   <p:extLst>
     <p:ext uri="{EFAFB233-063F-42B5-8137-9DF3F51BA10A}">
-      <p15:sldGuideLst xmlns:p15="http://schemas.microsoft.com/office/powerpoint/2012/main"/>
+      <p15:sldGuideLst xmlns:p15="http://schemas.microsoft.com/office/powerpoint/2012/main" xmlns=""/>
     </p:ext>
   </p:extLst>
 </p:presentation>
@@ -128,11 +128,7 @@
 <file path=ppt/commentAuthors.xml><?xml version="1.0" encoding="utf-8"?>
 <p:cmAuthorLst xmlns:a="http://schemas.openxmlformats.org/drawingml/2006/main" xmlns:r="http://schemas.openxmlformats.org/officeDocument/2006/relationships" xmlns:p="http://schemas.openxmlformats.org/presentationml/2006/main">
   <p:cmAuthor id="1" name="Minny" initials="M" lastIdx="1" clrIdx="0">
-    <p:extLst>
-      <p:ext uri="{19B8F6BF-5375-455C-9EA6-DF929625EA0E}">
-        <p15:presenceInfo xmlns:p15="http://schemas.microsoft.com/office/powerpoint/2012/main" userId="Minny" providerId="None"/>
-      </p:ext>
-    </p:extLst>
+    <p:extLst/>
   </p:cmAuthor>
 </p:cmAuthorLst>
 </file>
@@ -420,7 +416,7 @@
             <a:fld id="{5586B75A-687E-405C-8A0B-8D00578BA2C3}" type="datetimeFigureOut">
               <a:rPr lang="en-US" dirty="0"/>
               <a:pPr/>
-              <a:t>4/2/2018</a:t>
+              <a:t>4/3/2018</a:t>
             </a:fld>
             <a:endParaRPr lang="en-US" dirty="0"/>
           </a:p>
@@ -587,7 +583,7 @@
             <a:fld id="{5586B75A-687E-405C-8A0B-8D00578BA2C3}" type="datetimeFigureOut">
               <a:rPr lang="en-US" dirty="0"/>
               <a:pPr/>
-              <a:t>4/2/2018</a:t>
+              <a:t>4/3/2018</a:t>
             </a:fld>
             <a:endParaRPr lang="en-US" dirty="0"/>
           </a:p>
@@ -764,7 +760,7 @@
             <a:fld id="{5586B75A-687E-405C-8A0B-8D00578BA2C3}" type="datetimeFigureOut">
               <a:rPr lang="en-US" dirty="0"/>
               <a:pPr/>
-              <a:t>4/2/2018</a:t>
+              <a:t>4/3/2018</a:t>
             </a:fld>
             <a:endParaRPr lang="en-US" dirty="0"/>
           </a:p>
@@ -931,7 +927,7 @@
             <a:fld id="{5586B75A-687E-405C-8A0B-8D00578BA2C3}" type="datetimeFigureOut">
               <a:rPr lang="en-US" dirty="0"/>
               <a:pPr/>
-              <a:t>4/2/2018</a:t>
+              <a:t>4/3/2018</a:t>
             </a:fld>
             <a:endParaRPr lang="en-US" dirty="0"/>
           </a:p>
@@ -1186,7 +1182,7 @@
             <a:fld id="{5586B75A-687E-405C-8A0B-8D00578BA2C3}" type="datetimeFigureOut">
               <a:rPr lang="en-US" dirty="0"/>
               <a:pPr/>
-              <a:t>4/2/2018</a:t>
+              <a:t>4/3/2018</a:t>
             </a:fld>
             <a:endParaRPr lang="en-US" dirty="0"/>
           </a:p>
@@ -1471,7 +1467,7 @@
             <a:fld id="{5586B75A-687E-405C-8A0B-8D00578BA2C3}" type="datetimeFigureOut">
               <a:rPr lang="en-US" dirty="0"/>
               <a:pPr/>
-              <a:t>4/2/2018</a:t>
+              <a:t>4/3/2018</a:t>
             </a:fld>
             <a:endParaRPr lang="en-US" dirty="0"/>
           </a:p>
@@ -1910,7 +1906,7 @@
             <a:fld id="{5586B75A-687E-405C-8A0B-8D00578BA2C3}" type="datetimeFigureOut">
               <a:rPr lang="en-US" dirty="0"/>
               <a:pPr/>
-              <a:t>4/2/2018</a:t>
+              <a:t>4/3/2018</a:t>
             </a:fld>
             <a:endParaRPr lang="en-US" dirty="0"/>
           </a:p>
@@ -2025,7 +2021,7 @@
             <a:fld id="{5586B75A-687E-405C-8A0B-8D00578BA2C3}" type="datetimeFigureOut">
               <a:rPr lang="en-US" dirty="0"/>
               <a:pPr/>
-              <a:t>4/2/2018</a:t>
+              <a:t>4/3/2018</a:t>
             </a:fld>
             <a:endParaRPr lang="en-US" dirty="0"/>
           </a:p>
@@ -2117,7 +2113,7 @@
             <a:fld id="{5586B75A-687E-405C-8A0B-8D00578BA2C3}" type="datetimeFigureOut">
               <a:rPr lang="en-US" dirty="0"/>
               <a:pPr/>
-              <a:t>4/2/2018</a:t>
+              <a:t>4/3/2018</a:t>
             </a:fld>
             <a:endParaRPr lang="en-US" dirty="0"/>
           </a:p>
@@ -2402,7 +2398,7 @@
             <a:fld id="{5586B75A-687E-405C-8A0B-8D00578BA2C3}" type="datetimeFigureOut">
               <a:rPr lang="en-US" dirty="0"/>
               <a:pPr/>
-              <a:t>4/2/2018</a:t>
+              <a:t>4/3/2018</a:t>
             </a:fld>
             <a:endParaRPr lang="en-US" dirty="0"/>
           </a:p>
@@ -2672,7 +2668,7 @@
             <a:fld id="{5586B75A-687E-405C-8A0B-8D00578BA2C3}" type="datetimeFigureOut">
               <a:rPr lang="en-US" dirty="0"/>
               <a:pPr/>
-              <a:t>4/2/2018</a:t>
+              <a:t>4/3/2018</a:t>
             </a:fld>
             <a:endParaRPr lang="en-US" dirty="0"/>
           </a:p>
@@ -2966,7 +2962,7 @@
             <a:fld id="{5586B75A-687E-405C-8A0B-8D00578BA2C3}" type="datetimeFigureOut">
               <a:rPr lang="en-US" dirty="0"/>
               <a:pPr/>
-              <a:t>4/2/2018</a:t>
+              <a:t>4/3/2018</a:t>
             </a:fld>
             <a:endParaRPr lang="en-US" dirty="0"/>
           </a:p>
@@ -3450,7 +3446,7 @@
           <p:cNvPr id="2" name="Title 1">
             <a:extLst>
               <a:ext uri="{FF2B5EF4-FFF2-40B4-BE49-F238E27FC236}">
-                <a16:creationId xmlns:a16="http://schemas.microsoft.com/office/drawing/2014/main" id="{E69B7469-9B2F-4C0E-9D7B-02AED9B0EF10}"/>
+                <a16:creationId xmlns:a16="http://schemas.microsoft.com/office/drawing/2014/main" xmlns="" id="{E69B7469-9B2F-4C0E-9D7B-02AED9B0EF10}"/>
               </a:ext>
             </a:extLst>
           </p:cNvPr>
@@ -3478,7 +3474,7 @@
           <p:cNvPr id="3" name="Subtitle 2">
             <a:extLst>
               <a:ext uri="{FF2B5EF4-FFF2-40B4-BE49-F238E27FC236}">
-                <a16:creationId xmlns:a16="http://schemas.microsoft.com/office/drawing/2014/main" id="{2299AB8F-6EA0-4F46-A89D-CB847B3E1B12}"/>
+                <a16:creationId xmlns:a16="http://schemas.microsoft.com/office/drawing/2014/main" xmlns="" id="{2299AB8F-6EA0-4F46-A89D-CB847B3E1B12}"/>
               </a:ext>
             </a:extLst>
           </p:cNvPr>
@@ -3511,6 +3507,13 @@
   <p:clrMapOvr>
     <a:masterClrMapping/>
   </p:clrMapOvr>
+  <p:timing>
+    <p:tnLst>
+      <p:par>
+        <p:cTn id="1" dur="indefinite" restart="never" nodeType="tmRoot"/>
+      </p:par>
+    </p:tnLst>
+  </p:timing>
 </p:sld>
 </file>
 
@@ -3536,7 +3539,7 @@
           <p:cNvPr id="2" name="Title 1">
             <a:extLst>
               <a:ext uri="{FF2B5EF4-FFF2-40B4-BE49-F238E27FC236}">
-                <a16:creationId xmlns:a16="http://schemas.microsoft.com/office/drawing/2014/main" id="{A2C58B07-A1D4-4BF0-8FEE-C20DAA5690A1}"/>
+                <a16:creationId xmlns:a16="http://schemas.microsoft.com/office/drawing/2014/main" xmlns="" id="{A2C58B07-A1D4-4BF0-8FEE-C20DAA5690A1}"/>
               </a:ext>
             </a:extLst>
           </p:cNvPr>
@@ -3569,7 +3572,7 @@
           <p:cNvPr id="5" name="Content Placeholder 4">
             <a:extLst>
               <a:ext uri="{FF2B5EF4-FFF2-40B4-BE49-F238E27FC236}">
-                <a16:creationId xmlns:a16="http://schemas.microsoft.com/office/drawing/2014/main" id="{079287F6-5971-4B39-B17A-2E4CDA27C38A}"/>
+                <a16:creationId xmlns:a16="http://schemas.microsoft.com/office/drawing/2014/main" xmlns="" id="{079287F6-5971-4B39-B17A-2E4CDA27C38A}"/>
               </a:ext>
             </a:extLst>
           </p:cNvPr>
@@ -3598,7 +3601,7 @@
           <p:cNvPr id="7" name="Picture 6">
             <a:extLst>
               <a:ext uri="{FF2B5EF4-FFF2-40B4-BE49-F238E27FC236}">
-                <a16:creationId xmlns:a16="http://schemas.microsoft.com/office/drawing/2014/main" id="{F9D99DBA-6282-4B09-BBD6-26FC34D124F1}"/>
+                <a16:creationId xmlns:a16="http://schemas.microsoft.com/office/drawing/2014/main" xmlns="" id="{F9D99DBA-6282-4B09-BBD6-26FC34D124F1}"/>
               </a:ext>
             </a:extLst>
           </p:cNvPr>
@@ -3633,6 +3636,13 @@
   <p:clrMapOvr>
     <a:masterClrMapping/>
   </p:clrMapOvr>
+  <p:timing>
+    <p:tnLst>
+      <p:par>
+        <p:cTn id="1" dur="indefinite" restart="never" nodeType="tmRoot"/>
+      </p:par>
+    </p:tnLst>
+  </p:timing>
 </p:sld>
 </file>
 
@@ -3658,7 +3668,7 @@
           <p:cNvPr id="2" name="Title 1">
             <a:extLst>
               <a:ext uri="{FF2B5EF4-FFF2-40B4-BE49-F238E27FC236}">
-                <a16:creationId xmlns:a16="http://schemas.microsoft.com/office/drawing/2014/main" id="{C5D0DEA5-6C8E-4C39-A7DB-110DFAE5FFE5}"/>
+                <a16:creationId xmlns:a16="http://schemas.microsoft.com/office/drawing/2014/main" xmlns="" id="{C5D0DEA5-6C8E-4C39-A7DB-110DFAE5FFE5}"/>
               </a:ext>
             </a:extLst>
           </p:cNvPr>
@@ -3687,7 +3697,7 @@
           <p:cNvPr id="3" name="Content Placeholder 2">
             <a:extLst>
               <a:ext uri="{FF2B5EF4-FFF2-40B4-BE49-F238E27FC236}">
-                <a16:creationId xmlns:a16="http://schemas.microsoft.com/office/drawing/2014/main" id="{A8F024F9-5FFD-4484-8F1C-192C32BB304C}"/>
+                <a16:creationId xmlns:a16="http://schemas.microsoft.com/office/drawing/2014/main" xmlns="" id="{A8F024F9-5FFD-4484-8F1C-192C32BB304C}"/>
               </a:ext>
             </a:extLst>
           </p:cNvPr>
@@ -3738,6 +3748,13 @@
   <p:clrMapOvr>
     <a:masterClrMapping/>
   </p:clrMapOvr>
+  <p:timing>
+    <p:tnLst>
+      <p:par>
+        <p:cTn id="1" dur="indefinite" restart="never" nodeType="tmRoot"/>
+      </p:par>
+    </p:tnLst>
+  </p:timing>
 </p:sld>
 </file>
 
@@ -3763,7 +3780,7 @@
           <p:cNvPr id="2" name="Title 1">
             <a:extLst>
               <a:ext uri="{FF2B5EF4-FFF2-40B4-BE49-F238E27FC236}">
-                <a16:creationId xmlns:a16="http://schemas.microsoft.com/office/drawing/2014/main" id="{D2101A1D-F2ED-490B-92EB-E220B3424EF7}"/>
+                <a16:creationId xmlns:a16="http://schemas.microsoft.com/office/drawing/2014/main" xmlns="" id="{D2101A1D-F2ED-490B-92EB-E220B3424EF7}"/>
               </a:ext>
             </a:extLst>
           </p:cNvPr>
@@ -3792,7 +3809,7 @@
           <p:cNvPr id="3" name="Content Placeholder 2">
             <a:extLst>
               <a:ext uri="{FF2B5EF4-FFF2-40B4-BE49-F238E27FC236}">
-                <a16:creationId xmlns:a16="http://schemas.microsoft.com/office/drawing/2014/main" id="{BBF4195B-AE3B-407A-8702-A1CEBE07D158}"/>
+                <a16:creationId xmlns:a16="http://schemas.microsoft.com/office/drawing/2014/main" xmlns="" id="{BBF4195B-AE3B-407A-8702-A1CEBE07D158}"/>
               </a:ext>
             </a:extLst>
           </p:cNvPr>
@@ -3917,6 +3934,13 @@
   <p:clrMapOvr>
     <a:masterClrMapping/>
   </p:clrMapOvr>
+  <p:timing>
+    <p:tnLst>
+      <p:par>
+        <p:cTn id="1" dur="indefinite" restart="never" nodeType="tmRoot"/>
+      </p:par>
+    </p:tnLst>
+  </p:timing>
 </p:sld>
 </file>
 
@@ -3942,7 +3966,7 @@
           <p:cNvPr id="2" name="Title 1">
             <a:extLst>
               <a:ext uri="{FF2B5EF4-FFF2-40B4-BE49-F238E27FC236}">
-                <a16:creationId xmlns:a16="http://schemas.microsoft.com/office/drawing/2014/main" id="{D2101A1D-F2ED-490B-92EB-E220B3424EF7}"/>
+                <a16:creationId xmlns:a16="http://schemas.microsoft.com/office/drawing/2014/main" xmlns="" id="{D2101A1D-F2ED-490B-92EB-E220B3424EF7}"/>
               </a:ext>
             </a:extLst>
           </p:cNvPr>
@@ -3971,7 +3995,7 @@
           <p:cNvPr id="3" name="Content Placeholder 2">
             <a:extLst>
               <a:ext uri="{FF2B5EF4-FFF2-40B4-BE49-F238E27FC236}">
-                <a16:creationId xmlns:a16="http://schemas.microsoft.com/office/drawing/2014/main" id="{BBF4195B-AE3B-407A-8702-A1CEBE07D158}"/>
+                <a16:creationId xmlns:a16="http://schemas.microsoft.com/office/drawing/2014/main" xmlns="" id="{BBF4195B-AE3B-407A-8702-A1CEBE07D158}"/>
               </a:ext>
             </a:extLst>
           </p:cNvPr>
@@ -4009,6 +4033,13 @@
   <p:clrMapOvr>
     <a:masterClrMapping/>
   </p:clrMapOvr>
+  <p:timing>
+    <p:tnLst>
+      <p:par>
+        <p:cTn id="1" dur="indefinite" restart="never" nodeType="tmRoot"/>
+      </p:par>
+    </p:tnLst>
+  </p:timing>
 </p:sld>
 </file>
 
@@ -4034,7 +4065,7 @@
           <p:cNvPr id="2" name="Title 1">
             <a:extLst>
               <a:ext uri="{FF2B5EF4-FFF2-40B4-BE49-F238E27FC236}">
-                <a16:creationId xmlns:a16="http://schemas.microsoft.com/office/drawing/2014/main" id="{48CB2E1E-F2CA-4BC0-B171-8A889E17F884}"/>
+                <a16:creationId xmlns:a16="http://schemas.microsoft.com/office/drawing/2014/main" xmlns="" id="{48CB2E1E-F2CA-4BC0-B171-8A889E17F884}"/>
               </a:ext>
             </a:extLst>
           </p:cNvPr>
@@ -4072,6 +4103,13 @@
   <p:clrMapOvr>
     <a:masterClrMapping/>
   </p:clrMapOvr>
+  <p:timing>
+    <p:tnLst>
+      <p:par>
+        <p:cTn id="1" dur="indefinite" restart="never" nodeType="tmRoot"/>
+      </p:par>
+    </p:tnLst>
+  </p:timing>
 </p:sld>
 </file>
 
@@ -4097,7 +4135,7 @@
           <p:cNvPr id="2" name="Title 1">
             <a:extLst>
               <a:ext uri="{FF2B5EF4-FFF2-40B4-BE49-F238E27FC236}">
-                <a16:creationId xmlns:a16="http://schemas.microsoft.com/office/drawing/2014/main" id="{83A7EC75-4101-420F-814F-26B068BEBD27}"/>
+                <a16:creationId xmlns:a16="http://schemas.microsoft.com/office/drawing/2014/main" xmlns="" id="{83A7EC75-4101-420F-814F-26B068BEBD27}"/>
               </a:ext>
             </a:extLst>
           </p:cNvPr>
@@ -4126,7 +4164,7 @@
           <p:cNvPr id="3" name="Content Placeholder 2">
             <a:extLst>
               <a:ext uri="{FF2B5EF4-FFF2-40B4-BE49-F238E27FC236}">
-                <a16:creationId xmlns:a16="http://schemas.microsoft.com/office/drawing/2014/main" id="{DC5ED40B-B2BF-4913-9615-4F583FC1595E}"/>
+                <a16:creationId xmlns:a16="http://schemas.microsoft.com/office/drawing/2014/main" xmlns="" id="{DC5ED40B-B2BF-4913-9615-4F583FC1595E}"/>
               </a:ext>
             </a:extLst>
           </p:cNvPr>
@@ -4199,6 +4237,13 @@
   <p:clrMapOvr>
     <a:masterClrMapping/>
   </p:clrMapOvr>
+  <p:timing>
+    <p:tnLst>
+      <p:par>
+        <p:cTn id="1" dur="indefinite" restart="never" nodeType="tmRoot"/>
+      </p:par>
+    </p:tnLst>
+  </p:timing>
 </p:sld>
 </file>
 
@@ -4224,7 +4269,7 @@
           <p:cNvPr id="2" name="Title 1">
             <a:extLst>
               <a:ext uri="{FF2B5EF4-FFF2-40B4-BE49-F238E27FC236}">
-                <a16:creationId xmlns:a16="http://schemas.microsoft.com/office/drawing/2014/main" id="{DA129FB1-B146-408B-A3F5-15F104F577F3}"/>
+                <a16:creationId xmlns:a16="http://schemas.microsoft.com/office/drawing/2014/main" xmlns="" id="{DA129FB1-B146-408B-A3F5-15F104F577F3}"/>
               </a:ext>
             </a:extLst>
           </p:cNvPr>
@@ -4253,7 +4298,7 @@
           <p:cNvPr id="3" name="Content Placeholder 2">
             <a:extLst>
               <a:ext uri="{FF2B5EF4-FFF2-40B4-BE49-F238E27FC236}">
-                <a16:creationId xmlns:a16="http://schemas.microsoft.com/office/drawing/2014/main" id="{A6FB94C6-3BF8-4FE5-8566-37B8EAD1F771}"/>
+                <a16:creationId xmlns:a16="http://schemas.microsoft.com/office/drawing/2014/main" xmlns="" id="{A6FB94C6-3BF8-4FE5-8566-37B8EAD1F771}"/>
               </a:ext>
             </a:extLst>
           </p:cNvPr>
@@ -4324,6 +4369,13 @@
   <p:clrMapOvr>
     <a:masterClrMapping/>
   </p:clrMapOvr>
+  <p:timing>
+    <p:tnLst>
+      <p:par>
+        <p:cTn id="1" dur="indefinite" restart="never" nodeType="tmRoot"/>
+      </p:par>
+    </p:tnLst>
+  </p:timing>
 </p:sld>
 </file>
 
@@ -4349,7 +4401,7 @@
           <p:cNvPr id="2" name="Title 1">
             <a:extLst>
               <a:ext uri="{FF2B5EF4-FFF2-40B4-BE49-F238E27FC236}">
-                <a16:creationId xmlns:a16="http://schemas.microsoft.com/office/drawing/2014/main" id="{F7BE1882-99BB-4365-A118-1C31F280A32D}"/>
+                <a16:creationId xmlns:a16="http://schemas.microsoft.com/office/drawing/2014/main" xmlns="" id="{F7BE1882-99BB-4365-A118-1C31F280A32D}"/>
               </a:ext>
             </a:extLst>
           </p:cNvPr>
@@ -4378,7 +4430,7 @@
           <p:cNvPr id="3" name="Content Placeholder 2">
             <a:extLst>
               <a:ext uri="{FF2B5EF4-FFF2-40B4-BE49-F238E27FC236}">
-                <a16:creationId xmlns:a16="http://schemas.microsoft.com/office/drawing/2014/main" id="{162D072F-1554-4A17-BEAC-B62E922B4D85}"/>
+                <a16:creationId xmlns:a16="http://schemas.microsoft.com/office/drawing/2014/main" xmlns="" id="{162D072F-1554-4A17-BEAC-B62E922B4D85}"/>
               </a:ext>
             </a:extLst>
           </p:cNvPr>
@@ -4433,6 +4485,13 @@
   <p:clrMapOvr>
     <a:masterClrMapping/>
   </p:clrMapOvr>
+  <p:timing>
+    <p:tnLst>
+      <p:par>
+        <p:cTn id="1" dur="indefinite" restart="never" nodeType="tmRoot"/>
+      </p:par>
+    </p:tnLst>
+  </p:timing>
 </p:sld>
 </file>
 
@@ -4458,7 +4517,7 @@
           <p:cNvPr id="2" name="Title 1">
             <a:extLst>
               <a:ext uri="{FF2B5EF4-FFF2-40B4-BE49-F238E27FC236}">
-                <a16:creationId xmlns:a16="http://schemas.microsoft.com/office/drawing/2014/main" id="{0F605016-C505-470E-B152-4100BA4DD519}"/>
+                <a16:creationId xmlns:a16="http://schemas.microsoft.com/office/drawing/2014/main" xmlns="" id="{0F605016-C505-470E-B152-4100BA4DD519}"/>
               </a:ext>
             </a:extLst>
           </p:cNvPr>
@@ -4487,7 +4546,7 @@
           <p:cNvPr id="3" name="Content Placeholder 2">
             <a:extLst>
               <a:ext uri="{FF2B5EF4-FFF2-40B4-BE49-F238E27FC236}">
-                <a16:creationId xmlns:a16="http://schemas.microsoft.com/office/drawing/2014/main" id="{BEE22DA4-9485-43B5-AA7C-37B594A52FF6}"/>
+                <a16:creationId xmlns:a16="http://schemas.microsoft.com/office/drawing/2014/main" xmlns="" id="{BEE22DA4-9485-43B5-AA7C-37B594A52FF6}"/>
               </a:ext>
             </a:extLst>
           </p:cNvPr>
@@ -4577,6 +4636,13 @@
   <p:clrMapOvr>
     <a:masterClrMapping/>
   </p:clrMapOvr>
+  <p:timing>
+    <p:tnLst>
+      <p:par>
+        <p:cTn id="1" dur="indefinite" restart="never" nodeType="tmRoot"/>
+      </p:par>
+    </p:tnLst>
+  </p:timing>
 </p:sld>
 </file>
 
@@ -4602,7 +4668,7 @@
           <p:cNvPr id="2" name="Title 1">
             <a:extLst>
               <a:ext uri="{FF2B5EF4-FFF2-40B4-BE49-F238E27FC236}">
-                <a16:creationId xmlns:a16="http://schemas.microsoft.com/office/drawing/2014/main" id="{D15D94E2-91C9-45B4-AD19-711A37265B03}"/>
+                <a16:creationId xmlns:a16="http://schemas.microsoft.com/office/drawing/2014/main" xmlns="" id="{D15D94E2-91C9-45B4-AD19-711A37265B03}"/>
               </a:ext>
             </a:extLst>
           </p:cNvPr>
@@ -4638,7 +4704,7 @@
           <p:cNvPr id="3" name="Content Placeholder 2">
             <a:extLst>
               <a:ext uri="{FF2B5EF4-FFF2-40B4-BE49-F238E27FC236}">
-                <a16:creationId xmlns:a16="http://schemas.microsoft.com/office/drawing/2014/main" id="{92E63922-716A-4669-8E46-96915F4D1083}"/>
+                <a16:creationId xmlns:a16="http://schemas.microsoft.com/office/drawing/2014/main" xmlns="" id="{92E63922-716A-4669-8E46-96915F4D1083}"/>
               </a:ext>
             </a:extLst>
           </p:cNvPr>
@@ -4677,6 +4743,13 @@
   <p:clrMapOvr>
     <a:masterClrMapping/>
   </p:clrMapOvr>
+  <p:timing>
+    <p:tnLst>
+      <p:par>
+        <p:cTn id="1" dur="indefinite" restart="never" nodeType="tmRoot"/>
+      </p:par>
+    </p:tnLst>
+  </p:timing>
 </p:sld>
 </file>
 
@@ -4702,7 +4775,7 @@
           <p:cNvPr id="2" name="Title 1">
             <a:extLst>
               <a:ext uri="{FF2B5EF4-FFF2-40B4-BE49-F238E27FC236}">
-                <a16:creationId xmlns:a16="http://schemas.microsoft.com/office/drawing/2014/main" id="{AAEBA6E1-5E63-4B00-9358-0B0FCBB9F43D}"/>
+                <a16:creationId xmlns:a16="http://schemas.microsoft.com/office/drawing/2014/main" xmlns="" id="{AAEBA6E1-5E63-4B00-9358-0B0FCBB9F43D}"/>
               </a:ext>
             </a:extLst>
           </p:cNvPr>
@@ -4724,6 +4797,10 @@
             <a:r>
               <a:rPr lang="en-US" sz="3100" dirty="0"/>
               <a:t>Does weather affect crime incidence? Do crimes occur more often in areas experiencing extreme seasonal weather changes?</a:t>
+            </a:r>
+            <a:r>
+              <a:rPr lang="en-US" dirty="0"/>
+              <a:t/>
             </a:r>
             <a:br>
               <a:rPr lang="en-US" dirty="0"/>
@@ -4737,7 +4814,7 @@
           <p:cNvPr id="33" name="Content Placeholder 32">
             <a:extLst>
               <a:ext uri="{FF2B5EF4-FFF2-40B4-BE49-F238E27FC236}">
-                <a16:creationId xmlns:a16="http://schemas.microsoft.com/office/drawing/2014/main" id="{B4EDC999-2F3E-47F4-B462-88BA6BDE808D}"/>
+                <a16:creationId xmlns:a16="http://schemas.microsoft.com/office/drawing/2014/main" xmlns="" id="{B4EDC999-2F3E-47F4-B462-88BA6BDE808D}"/>
               </a:ext>
             </a:extLst>
           </p:cNvPr>
@@ -4766,7 +4843,7 @@
           <p:cNvPr id="35" name="Picture 34">
             <a:extLst>
               <a:ext uri="{FF2B5EF4-FFF2-40B4-BE49-F238E27FC236}">
-                <a16:creationId xmlns:a16="http://schemas.microsoft.com/office/drawing/2014/main" id="{7E4A5558-6A97-4E08-81A1-423D84DBA2D4}"/>
+                <a16:creationId xmlns:a16="http://schemas.microsoft.com/office/drawing/2014/main" xmlns="" id="{7E4A5558-6A97-4E08-81A1-423D84DBA2D4}"/>
               </a:ext>
             </a:extLst>
           </p:cNvPr>
@@ -4791,6 +4868,74 @@
           </a:prstGeom>
         </p:spPr>
       </p:pic>
+      <p:sp>
+        <p:nvSpPr>
+          <p:cNvPr id="5" name="Rectangle 4">
+            <a:extLst>
+              <a:ext uri="{FF2B5EF4-FFF2-40B4-BE49-F238E27FC236}">
+                <a16:creationId xmlns:a16="http://schemas.microsoft.com/office/drawing/2014/main" xmlns="" id="{6BCF0038-16FE-4456-8F0D-B96341EA5130}"/>
+              </a:ext>
+            </a:extLst>
+          </p:cNvPr>
+          <p:cNvSpPr/>
+          <p:nvPr/>
+        </p:nvSpPr>
+        <p:spPr>
+          <a:xfrm>
+            <a:off x="4209715" y="21946"/>
+            <a:ext cx="3900299" cy="236796"/>
+          </a:xfrm>
+          <a:prstGeom prst="rect">
+            <a:avLst/>
+          </a:prstGeom>
+          <a:solidFill>
+            <a:schemeClr val="bg1"/>
+          </a:solidFill>
+          <a:ln>
+            <a:solidFill>
+              <a:schemeClr val="bg1"/>
+            </a:solidFill>
+          </a:ln>
+        </p:spPr>
+        <p:style>
+          <a:lnRef idx="2">
+            <a:schemeClr val="accent1">
+              <a:shade val="50000"/>
+            </a:schemeClr>
+          </a:lnRef>
+          <a:fillRef idx="1">
+            <a:schemeClr val="accent1"/>
+          </a:fillRef>
+          <a:effectRef idx="0">
+            <a:schemeClr val="accent1"/>
+          </a:effectRef>
+          <a:fontRef idx="minor">
+            <a:schemeClr val="lt1"/>
+          </a:fontRef>
+        </p:style>
+        <p:txBody>
+          <a:bodyPr rtlCol="0" anchor="ctr"/>
+          <a:lstStyle/>
+          <a:p>
+            <a:pPr algn="ctr"/>
+            <a:r>
+              <a:rPr lang="en-US" sz="1400" dirty="0" smtClean="0">
+                <a:solidFill>
+                  <a:schemeClr val="tx1"/>
+                </a:solidFill>
+                <a:latin typeface="Calibri" panose="020F0502020204030204" pitchFamily="34" charset="0"/>
+              </a:rPr>
+              <a:t>LA: Crime Category v. Temp</a:t>
+            </a:r>
+            <a:endParaRPr lang="en-US" sz="1400" dirty="0">
+              <a:solidFill>
+                <a:schemeClr val="tx1"/>
+              </a:solidFill>
+              <a:latin typeface="Calibri" panose="020F0502020204030204" pitchFamily="34" charset="0"/>
+            </a:endParaRPr>
+          </a:p>
+        </p:txBody>
+      </p:sp>
     </p:spTree>
     <p:extLst>
       <p:ext uri="{BB962C8B-B14F-4D97-AF65-F5344CB8AC3E}">
@@ -4801,6 +4946,13 @@
   <p:clrMapOvr>
     <a:masterClrMapping/>
   </p:clrMapOvr>
+  <p:timing>
+    <p:tnLst>
+      <p:par>
+        <p:cTn id="1" dur="indefinite" restart="never" nodeType="tmRoot"/>
+      </p:par>
+    </p:tnLst>
+  </p:timing>
 </p:sld>
 </file>
 
@@ -4826,7 +4978,7 @@
           <p:cNvPr id="2" name="Title 1">
             <a:extLst>
               <a:ext uri="{FF2B5EF4-FFF2-40B4-BE49-F238E27FC236}">
-                <a16:creationId xmlns:a16="http://schemas.microsoft.com/office/drawing/2014/main" id="{6B33C208-721D-4FB4-94B2-FD3E08DC28A8}"/>
+                <a16:creationId xmlns:a16="http://schemas.microsoft.com/office/drawing/2014/main" xmlns="" id="{6B33C208-721D-4FB4-94B2-FD3E08DC28A8}"/>
               </a:ext>
             </a:extLst>
           </p:cNvPr>
@@ -4859,7 +5011,7 @@
           <p:cNvPr id="6" name="Content Placeholder 5">
             <a:extLst>
               <a:ext uri="{FF2B5EF4-FFF2-40B4-BE49-F238E27FC236}">
-                <a16:creationId xmlns:a16="http://schemas.microsoft.com/office/drawing/2014/main" id="{703B6654-B732-46FC-943A-E79355B2C7D4}"/>
+                <a16:creationId xmlns:a16="http://schemas.microsoft.com/office/drawing/2014/main" xmlns="" id="{703B6654-B732-46FC-943A-E79355B2C7D4}"/>
               </a:ext>
             </a:extLst>
           </p:cNvPr>
@@ -4888,7 +5040,7 @@
           <p:cNvPr id="8" name="Picture 7">
             <a:extLst>
               <a:ext uri="{FF2B5EF4-FFF2-40B4-BE49-F238E27FC236}">
-                <a16:creationId xmlns:a16="http://schemas.microsoft.com/office/drawing/2014/main" id="{D0E3F868-886D-401A-818F-08F162FC7A14}"/>
+                <a16:creationId xmlns:a16="http://schemas.microsoft.com/office/drawing/2014/main" xmlns="" id="{D0E3F868-886D-401A-818F-08F162FC7A14}"/>
               </a:ext>
             </a:extLst>
           </p:cNvPr>
@@ -4918,7 +5070,7 @@
           <p:cNvPr id="3" name="Rectangle 2">
             <a:extLst>
               <a:ext uri="{FF2B5EF4-FFF2-40B4-BE49-F238E27FC236}">
-                <a16:creationId xmlns:a16="http://schemas.microsoft.com/office/drawing/2014/main" id="{6BCF0038-16FE-4456-8F0D-B96341EA5130}"/>
+                <a16:creationId xmlns:a16="http://schemas.microsoft.com/office/drawing/2014/main" xmlns="" id="{6BCF0038-16FE-4456-8F0D-B96341EA5130}"/>
               </a:ext>
             </a:extLst>
           </p:cNvPr>
@@ -4927,7 +5079,7 @@
         </p:nvSpPr>
         <p:spPr>
           <a:xfrm>
-            <a:off x="3794078" y="2647666"/>
+            <a:off x="3794078" y="2655286"/>
             <a:ext cx="3900299" cy="177421"/>
           </a:xfrm>
           <a:prstGeom prst="rect">
@@ -4963,10 +5115,269 @@
           <a:lstStyle/>
           <a:p>
             <a:pPr algn="ctr"/>
-            <a:endParaRPr lang="en-US"/>
-          </a:p>
-        </p:txBody>
-      </p:sp>
+            <a:r>
+              <a:rPr lang="en-US" sz="1200" dirty="0" smtClean="0">
+                <a:solidFill>
+                  <a:schemeClr val="tx1"/>
+                </a:solidFill>
+                <a:effectLst>
+                  <a:outerShdw blurRad="50800" dist="38100" dir="16200000" rotWithShape="0">
+                    <a:prstClr val="black">
+                      <a:alpha val="40000"/>
+                    </a:prstClr>
+                  </a:outerShdw>
+                </a:effectLst>
+                <a:latin typeface="Calibri" panose="020F0502020204030204" pitchFamily="34" charset="0"/>
+              </a:rPr>
+              <a:t>2015                      2016                      2017</a:t>
+            </a:r>
+            <a:endParaRPr lang="en-US" sz="1200" dirty="0">
+              <a:solidFill>
+                <a:schemeClr val="tx1"/>
+              </a:solidFill>
+              <a:effectLst>
+                <a:outerShdw blurRad="50800" dist="38100" dir="16200000" rotWithShape="0">
+                  <a:prstClr val="black">
+                    <a:alpha val="40000"/>
+                  </a:prstClr>
+                </a:outerShdw>
+              </a:effectLst>
+              <a:latin typeface="Calibri" panose="020F0502020204030204" pitchFamily="34" charset="0"/>
+            </a:endParaRPr>
+          </a:p>
+        </p:txBody>
+      </p:sp>
+      <p:cxnSp>
+        <p:nvCxnSpPr>
+          <p:cNvPr id="5" name="Straight Connector 4"/>
+          <p:cNvCxnSpPr/>
+          <p:nvPr/>
+        </p:nvCxnSpPr>
+        <p:spPr>
+          <a:xfrm>
+            <a:off x="4110990" y="2642207"/>
+            <a:ext cx="0" cy="88710"/>
+          </a:xfrm>
+          <a:prstGeom prst="line">
+            <a:avLst/>
+          </a:prstGeom>
+        </p:spPr>
+        <p:style>
+          <a:lnRef idx="1">
+            <a:schemeClr val="dk1"/>
+          </a:lnRef>
+          <a:fillRef idx="0">
+            <a:schemeClr val="dk1"/>
+          </a:fillRef>
+          <a:effectRef idx="0">
+            <a:schemeClr val="dk1"/>
+          </a:effectRef>
+          <a:fontRef idx="minor">
+            <a:schemeClr val="tx1"/>
+          </a:fontRef>
+        </p:style>
+      </p:cxnSp>
+      <p:cxnSp>
+        <p:nvCxnSpPr>
+          <p:cNvPr id="9" name="Straight Connector 8"/>
+          <p:cNvCxnSpPr/>
+          <p:nvPr/>
+        </p:nvCxnSpPr>
+        <p:spPr>
+          <a:xfrm>
+            <a:off x="5223510" y="2638909"/>
+            <a:ext cx="0" cy="88710"/>
+          </a:xfrm>
+          <a:prstGeom prst="line">
+            <a:avLst/>
+          </a:prstGeom>
+        </p:spPr>
+        <p:style>
+          <a:lnRef idx="1">
+            <a:schemeClr val="dk1"/>
+          </a:lnRef>
+          <a:fillRef idx="0">
+            <a:schemeClr val="dk1"/>
+          </a:fillRef>
+          <a:effectRef idx="0">
+            <a:schemeClr val="dk1"/>
+          </a:effectRef>
+          <a:fontRef idx="minor">
+            <a:schemeClr val="tx1"/>
+          </a:fontRef>
+        </p:style>
+      </p:cxnSp>
+      <p:cxnSp>
+        <p:nvCxnSpPr>
+          <p:cNvPr id="10" name="Straight Connector 9"/>
+          <p:cNvCxnSpPr/>
+          <p:nvPr/>
+        </p:nvCxnSpPr>
+        <p:spPr>
+          <a:xfrm>
+            <a:off x="6225540" y="2638909"/>
+            <a:ext cx="0" cy="88710"/>
+          </a:xfrm>
+          <a:prstGeom prst="line">
+            <a:avLst/>
+          </a:prstGeom>
+        </p:spPr>
+        <p:style>
+          <a:lnRef idx="1">
+            <a:schemeClr val="dk1"/>
+          </a:lnRef>
+          <a:fillRef idx="0">
+            <a:schemeClr val="dk1"/>
+          </a:fillRef>
+          <a:effectRef idx="0">
+            <a:schemeClr val="dk1"/>
+          </a:effectRef>
+          <a:fontRef idx="minor">
+            <a:schemeClr val="tx1"/>
+          </a:fontRef>
+        </p:style>
+      </p:cxnSp>
+      <p:cxnSp>
+        <p:nvCxnSpPr>
+          <p:cNvPr id="11" name="Straight Connector 10"/>
+          <p:cNvCxnSpPr/>
+          <p:nvPr/>
+        </p:nvCxnSpPr>
+        <p:spPr>
+          <a:xfrm>
+            <a:off x="7315200" y="2638909"/>
+            <a:ext cx="0" cy="88710"/>
+          </a:xfrm>
+          <a:prstGeom prst="line">
+            <a:avLst/>
+          </a:prstGeom>
+        </p:spPr>
+        <p:style>
+          <a:lnRef idx="1">
+            <a:schemeClr val="dk1"/>
+          </a:lnRef>
+          <a:fillRef idx="0">
+            <a:schemeClr val="dk1"/>
+          </a:fillRef>
+          <a:effectRef idx="0">
+            <a:schemeClr val="dk1"/>
+          </a:effectRef>
+          <a:fontRef idx="minor">
+            <a:schemeClr val="tx1"/>
+          </a:fontRef>
+        </p:style>
+      </p:cxnSp>
+      <p:pic>
+        <p:nvPicPr>
+          <p:cNvPr id="12" name="Content Placeholder 5">
+            <a:extLst>
+              <a:ext uri="{FF2B5EF4-FFF2-40B4-BE49-F238E27FC236}">
+                <a16:creationId xmlns:a16="http://schemas.microsoft.com/office/drawing/2014/main" xmlns="" id="{703B6654-B732-46FC-943A-E79355B2C7D4}"/>
+              </a:ext>
+            </a:extLst>
+          </p:cNvPr>
+          <p:cNvPicPr>
+            <a:picLocks noChangeAspect="1"/>
+          </p:cNvPicPr>
+          <p:nvPr/>
+        </p:nvPicPr>
+        <p:blipFill rotWithShape="1">
+          <a:blip r:embed="rId4">
+            <a:extLst>
+              <a:ext uri="{BEBA8EAE-BF5A-486C-A8C5-ECC9F3942E4B}">
+                <a14:imgProps xmlns:a14="http://schemas.microsoft.com/office/drawing/2010/main">
+                  <a14:imgLayer r:embed="rId5">
+                    <a14:imgEffect>
+                      <a14:brightnessContrast contrast="40000"/>
+                    </a14:imgEffect>
+                  </a14:imgLayer>
+                </a14:imgProps>
+              </a:ext>
+            </a:extLst>
+          </a:blip>
+          <a:srcRect l="75864" t="8707" r="2946" b="77183"/>
+          <a:stretch/>
+        </p:blipFill>
+        <p:spPr>
+          <a:xfrm>
+            <a:off x="7521261" y="334849"/>
+            <a:ext cx="1107583" cy="515155"/>
+          </a:xfrm>
+          <a:prstGeom prst="rect">
+            <a:avLst/>
+          </a:prstGeom>
+        </p:spPr>
+      </p:pic>
+      <p:cxnSp>
+        <p:nvCxnSpPr>
+          <p:cNvPr id="13" name="Straight Connector 12"/>
+          <p:cNvCxnSpPr/>
+          <p:nvPr/>
+        </p:nvCxnSpPr>
+        <p:spPr>
+          <a:xfrm>
+            <a:off x="7689030" y="508000"/>
+            <a:ext cx="182297" cy="0"/>
+          </a:xfrm>
+          <a:prstGeom prst="line">
+            <a:avLst/>
+          </a:prstGeom>
+          <a:ln w="25400">
+            <a:solidFill>
+              <a:srgbClr val="3B82D7"/>
+            </a:solidFill>
+          </a:ln>
+        </p:spPr>
+        <p:style>
+          <a:lnRef idx="1">
+            <a:schemeClr val="accent1"/>
+          </a:lnRef>
+          <a:fillRef idx="0">
+            <a:schemeClr val="accent1"/>
+          </a:fillRef>
+          <a:effectRef idx="0">
+            <a:schemeClr val="accent1"/>
+          </a:effectRef>
+          <a:fontRef idx="minor">
+            <a:schemeClr val="tx1"/>
+          </a:fontRef>
+        </p:style>
+      </p:cxnSp>
+      <p:cxnSp>
+        <p:nvCxnSpPr>
+          <p:cNvPr id="15" name="Straight Connector 14"/>
+          <p:cNvCxnSpPr/>
+          <p:nvPr/>
+        </p:nvCxnSpPr>
+        <p:spPr>
+          <a:xfrm>
+            <a:off x="7689030" y="700505"/>
+            <a:ext cx="182297" cy="0"/>
+          </a:xfrm>
+          <a:prstGeom prst="line">
+            <a:avLst/>
+          </a:prstGeom>
+          <a:ln w="25400">
+            <a:solidFill>
+              <a:srgbClr val="FDB68B"/>
+            </a:solidFill>
+          </a:ln>
+        </p:spPr>
+        <p:style>
+          <a:lnRef idx="1">
+            <a:schemeClr val="accent1"/>
+          </a:lnRef>
+          <a:fillRef idx="0">
+            <a:schemeClr val="accent1"/>
+          </a:fillRef>
+          <a:effectRef idx="0">
+            <a:schemeClr val="accent1"/>
+          </a:effectRef>
+          <a:fontRef idx="minor">
+            <a:schemeClr val="tx1"/>
+          </a:fontRef>
+        </p:style>
+      </p:cxnSp>
     </p:spTree>
     <p:extLst>
       <p:ext uri="{BB962C8B-B14F-4D97-AF65-F5344CB8AC3E}">
@@ -4977,6 +5388,13 @@
   <p:clrMapOvr>
     <a:masterClrMapping/>
   </p:clrMapOvr>
+  <p:timing>
+    <p:tnLst>
+      <p:par>
+        <p:cTn id="1" dur="indefinite" restart="never" nodeType="tmRoot"/>
+      </p:par>
+    </p:tnLst>
+  </p:timing>
 </p:sld>
 </file>
 
@@ -5002,7 +5420,7 @@
           <p:cNvPr id="2" name="Title 1">
             <a:extLst>
               <a:ext uri="{FF2B5EF4-FFF2-40B4-BE49-F238E27FC236}">
-                <a16:creationId xmlns:a16="http://schemas.microsoft.com/office/drawing/2014/main" id="{73BAE7B6-A2F1-4F3D-8F74-60E7CAF00247}"/>
+                <a16:creationId xmlns:a16="http://schemas.microsoft.com/office/drawing/2014/main" xmlns="" id="{73BAE7B6-A2F1-4F3D-8F74-60E7CAF00247}"/>
               </a:ext>
             </a:extLst>
           </p:cNvPr>
@@ -5035,7 +5453,7 @@
           <p:cNvPr id="5" name="Content Placeholder 4">
             <a:extLst>
               <a:ext uri="{FF2B5EF4-FFF2-40B4-BE49-F238E27FC236}">
-                <a16:creationId xmlns:a16="http://schemas.microsoft.com/office/drawing/2014/main" id="{24379F97-968F-4588-93B2-2063AAD4329A}"/>
+                <a16:creationId xmlns:a16="http://schemas.microsoft.com/office/drawing/2014/main" xmlns="" id="{24379F97-968F-4588-93B2-2063AAD4329A}"/>
               </a:ext>
             </a:extLst>
           </p:cNvPr>
@@ -5064,7 +5482,7 @@
           <p:cNvPr id="7" name="Picture 6">
             <a:extLst>
               <a:ext uri="{FF2B5EF4-FFF2-40B4-BE49-F238E27FC236}">
-                <a16:creationId xmlns:a16="http://schemas.microsoft.com/office/drawing/2014/main" id="{A737FF2D-4701-43AF-9DA3-4335C7B713D7}"/>
+                <a16:creationId xmlns:a16="http://schemas.microsoft.com/office/drawing/2014/main" xmlns="" id="{A737FF2D-4701-43AF-9DA3-4335C7B713D7}"/>
               </a:ext>
             </a:extLst>
           </p:cNvPr>
@@ -5099,6 +5517,13 @@
   <p:clrMapOvr>
     <a:masterClrMapping/>
   </p:clrMapOvr>
+  <p:timing>
+    <p:tnLst>
+      <p:par>
+        <p:cTn id="1" dur="indefinite" restart="never" nodeType="tmRoot"/>
+      </p:par>
+    </p:tnLst>
+  </p:timing>
 </p:sld>
 </file>
 
@@ -5327,7 +5752,7 @@
   <a:extraClrSchemeLst/>
   <a:extLst>
     <a:ext uri="{05A4C25C-085E-4340-85A3-A5531E510DB2}">
-      <thm15:themeFamily xmlns:thm15="http://schemas.microsoft.com/office/thememl/2012/main" name="Frame" id="{F226E7A2-7162-461C-9490-D27D9DC04E43}" vid="{629A0216-3BBD-45C0-B63F-2683BEA18F60}"/>
+      <thm15:themeFamily xmlns:thm15="http://schemas.microsoft.com/office/thememl/2012/main" xmlns="" name="Frame" id="{F226E7A2-7162-461C-9490-D27D9DC04E43}" vid="{629A0216-3BBD-45C0-B63F-2683BEA18F60}"/>
     </a:ext>
   </a:extLst>
 </a:theme>

</xml_diff>

<commit_message>
Updated Report and Prezzo
Edits to report
</commit_message>
<xml_diff>
--- a/Weather and Crime Data Analysis Presentation.pptx
+++ b/Weather and Crime Data Analysis Presentation.pptx
@@ -119,7 +119,18 @@
   </p:defaultTextStyle>
   <p:extLst>
     <p:ext uri="{EFAFB233-063F-42B5-8137-9DF3F51BA10A}">
-      <p15:sldGuideLst xmlns:p15="http://schemas.microsoft.com/office/powerpoint/2012/main" xmlns=""/>
+      <p15:sldGuideLst xmlns:p15="http://schemas.microsoft.com/office/powerpoint/2012/main">
+        <p15:guide id="1" orient="horz" pos="2160">
+          <p15:clr>
+            <a:srgbClr val="A4A3A4"/>
+          </p15:clr>
+        </p15:guide>
+        <p15:guide id="2" pos="3840">
+          <p15:clr>
+            <a:srgbClr val="A4A3A4"/>
+          </p15:clr>
+        </p15:guide>
+      </p15:sldGuideLst>
     </p:ext>
   </p:extLst>
 </p:presentation>
@@ -137,8 +148,8 @@
 <pc:chgInfo xmlns:a="http://schemas.openxmlformats.org/drawingml/2006/main" xmlns:r="http://schemas.openxmlformats.org/officeDocument/2006/relationships" xmlns:ac="http://schemas.microsoft.com/office/drawing/2013/main/command" xmlns:pc="http://schemas.microsoft.com/office/powerpoint/2013/main/command">
   <pc:docChgLst>
     <pc:chgData name="Michael Montoya" userId="4c01172a6138ec04" providerId="LiveId" clId="{F82ECFCA-C724-41EF-9B16-C409E4CFE3B9}"/>
-    <pc:docChg chg="addSld modSld">
-      <pc:chgData name="Michael Montoya" userId="4c01172a6138ec04" providerId="LiveId" clId="{F82ECFCA-C724-41EF-9B16-C409E4CFE3B9}" dt="2018-04-01T22:50:25.438" v="5" actId="20577"/>
+    <pc:docChg chg="undo custSel addSld modSld">
+      <pc:chgData name="Michael Montoya" userId="4c01172a6138ec04" providerId="LiveId" clId="{F82ECFCA-C724-41EF-9B16-C409E4CFE3B9}" dt="2018-04-04T05:58:02.409" v="327" actId="1076"/>
       <pc:docMkLst>
         <pc:docMk/>
       </pc:docMkLst>
@@ -157,6 +168,21 @@
           </ac:spMkLst>
         </pc:spChg>
       </pc:sldChg>
+      <pc:sldChg chg="modSp">
+        <pc:chgData name="Michael Montoya" userId="4c01172a6138ec04" providerId="LiveId" clId="{F82ECFCA-C724-41EF-9B16-C409E4CFE3B9}" dt="2018-04-04T04:50:13.496" v="294" actId="20577"/>
+        <pc:sldMkLst>
+          <pc:docMk/>
+          <pc:sldMk cId="4174163595" sldId="261"/>
+        </pc:sldMkLst>
+        <pc:spChg chg="mod">
+          <ac:chgData name="Michael Montoya" userId="4c01172a6138ec04" providerId="LiveId" clId="{F82ECFCA-C724-41EF-9B16-C409E4CFE3B9}" dt="2018-04-04T04:50:13.496" v="294" actId="20577"/>
+          <ac:spMkLst>
+            <pc:docMk/>
+            <pc:sldMk cId="4174163595" sldId="261"/>
+            <ac:spMk id="3" creationId="{A8F024F9-5FFD-4484-8F1C-192C32BB304C}"/>
+          </ac:spMkLst>
+        </pc:spChg>
+      </pc:sldChg>
       <pc:sldChg chg="modSp add">
         <pc:chgData name="Michael Montoya" userId="4c01172a6138ec04" providerId="LiveId" clId="{F82ECFCA-C724-41EF-9B16-C409E4CFE3B9}" dt="2018-04-01T22:50:25.438" v="5" actId="20577"/>
         <pc:sldMkLst>
@@ -171,6 +197,85 @@
             <ac:spMk id="2" creationId="{83A7EC75-4101-420F-814F-26B068BEBD27}"/>
           </ac:spMkLst>
         </pc:spChg>
+      </pc:sldChg>
+      <pc:sldChg chg="addSp delSp modSp modAnim">
+        <pc:chgData name="Michael Montoya" userId="4c01172a6138ec04" providerId="LiveId" clId="{F82ECFCA-C724-41EF-9B16-C409E4CFE3B9}" dt="2018-04-04T05:58:02.409" v="327" actId="1076"/>
+        <pc:sldMkLst>
+          <pc:docMk/>
+          <pc:sldMk cId="1992219538" sldId="267"/>
+        </pc:sldMkLst>
+        <pc:spChg chg="add del mod">
+          <ac:chgData name="Michael Montoya" userId="4c01172a6138ec04" providerId="LiveId" clId="{F82ECFCA-C724-41EF-9B16-C409E4CFE3B9}" dt="2018-04-04T05:38:40.529" v="298" actId="478"/>
+          <ac:spMkLst>
+            <pc:docMk/>
+            <pc:sldMk cId="1992219538" sldId="267"/>
+            <ac:spMk id="4" creationId="{4299992D-2270-4145-9ACE-A9A8EEEA2D14}"/>
+          </ac:spMkLst>
+        </pc:spChg>
+        <pc:spChg chg="del">
+          <ac:chgData name="Michael Montoya" userId="4c01172a6138ec04" providerId="LiveId" clId="{F82ECFCA-C724-41EF-9B16-C409E4CFE3B9}" dt="2018-04-04T05:50:55.962" v="315" actId="478"/>
+          <ac:spMkLst>
+            <pc:docMk/>
+            <pc:sldMk cId="1992219538" sldId="267"/>
+            <ac:spMk id="5" creationId="{6BCF0038-16FE-4456-8F0D-B96341EA5130}"/>
+          </ac:spMkLst>
+        </pc:spChg>
+        <pc:spChg chg="add del mod">
+          <ac:chgData name="Michael Montoya" userId="4c01172a6138ec04" providerId="LiveId" clId="{F82ECFCA-C724-41EF-9B16-C409E4CFE3B9}" dt="2018-04-04T05:41:51.901" v="301" actId="931"/>
+          <ac:spMkLst>
+            <pc:docMk/>
+            <pc:sldMk cId="1992219538" sldId="267"/>
+            <ac:spMk id="7" creationId="{4E03887B-4E9E-4B3C-A04E-1E07935388C0}"/>
+          </ac:spMkLst>
+        </pc:spChg>
+        <pc:picChg chg="add mod">
+          <ac:chgData name="Michael Montoya" userId="4c01172a6138ec04" providerId="LiveId" clId="{F82ECFCA-C724-41EF-9B16-C409E4CFE3B9}" dt="2018-04-04T05:42:23.972" v="302" actId="1076"/>
+          <ac:picMkLst>
+            <pc:docMk/>
+            <pc:sldMk cId="1992219538" sldId="267"/>
+            <ac:picMk id="9" creationId="{1ABB43A6-DC74-46A3-A26A-81C4F07F5319}"/>
+          </ac:picMkLst>
+        </pc:picChg>
+        <pc:picChg chg="add mod">
+          <ac:chgData name="Michael Montoya" userId="4c01172a6138ec04" providerId="LiveId" clId="{F82ECFCA-C724-41EF-9B16-C409E4CFE3B9}" dt="2018-04-04T05:57:56.248" v="326" actId="1076"/>
+          <ac:picMkLst>
+            <pc:docMk/>
+            <pc:sldMk cId="1992219538" sldId="267"/>
+            <ac:picMk id="11" creationId="{0B5EFD5A-E066-42A8-9883-5F4160D935AE}"/>
+          </ac:picMkLst>
+        </pc:picChg>
+        <pc:picChg chg="add mod">
+          <ac:chgData name="Michael Montoya" userId="4c01172a6138ec04" providerId="LiveId" clId="{F82ECFCA-C724-41EF-9B16-C409E4CFE3B9}" dt="2018-04-04T05:58:02.409" v="327" actId="1076"/>
+          <ac:picMkLst>
+            <pc:docMk/>
+            <pc:sldMk cId="1992219538" sldId="267"/>
+            <ac:picMk id="13" creationId="{4A14A518-A7CE-4A64-A94E-8F36AA6B108D}"/>
+          </ac:picMkLst>
+        </pc:picChg>
+        <pc:picChg chg="add mod">
+          <ac:chgData name="Michael Montoya" userId="4c01172a6138ec04" providerId="LiveId" clId="{F82ECFCA-C724-41EF-9B16-C409E4CFE3B9}" dt="2018-04-04T05:45:57.384" v="308" actId="1076"/>
+          <ac:picMkLst>
+            <pc:docMk/>
+            <pc:sldMk cId="1992219538" sldId="267"/>
+            <ac:picMk id="15" creationId="{0AFB7337-485F-48F7-9DBD-4F8B2413609A}"/>
+          </ac:picMkLst>
+        </pc:picChg>
+        <pc:picChg chg="add del">
+          <ac:chgData name="Michael Montoya" userId="4c01172a6138ec04" providerId="LiveId" clId="{F82ECFCA-C724-41EF-9B16-C409E4CFE3B9}" dt="2018-04-04T05:41:15.179" v="299" actId="478"/>
+          <ac:picMkLst>
+            <pc:docMk/>
+            <pc:sldMk cId="1992219538" sldId="267"/>
+            <ac:picMk id="33" creationId="{B4EDC999-2F3E-47F4-B462-88BA6BDE808D}"/>
+          </ac:picMkLst>
+        </pc:picChg>
+        <pc:picChg chg="add del">
+          <ac:chgData name="Michael Montoya" userId="4c01172a6138ec04" providerId="LiveId" clId="{F82ECFCA-C724-41EF-9B16-C409E4CFE3B9}" dt="2018-04-04T05:41:21.905" v="300" actId="478"/>
+          <ac:picMkLst>
+            <pc:docMk/>
+            <pc:sldMk cId="1992219538" sldId="267"/>
+            <ac:picMk id="35" creationId="{7E4A5558-6A97-4E08-81A1-423D84DBA2D4}"/>
+          </ac:picMkLst>
+        </pc:picChg>
       </pc:sldChg>
     </pc:docChg>
   </pc:docChgLst>
@@ -3446,7 +3551,7 @@
           <p:cNvPr id="2" name="Title 1">
             <a:extLst>
               <a:ext uri="{FF2B5EF4-FFF2-40B4-BE49-F238E27FC236}">
-                <a16:creationId xmlns:a16="http://schemas.microsoft.com/office/drawing/2014/main" xmlns="" id="{E69B7469-9B2F-4C0E-9D7B-02AED9B0EF10}"/>
+                <a16:creationId xmlns:a16="http://schemas.microsoft.com/office/drawing/2014/main" id="{E69B7469-9B2F-4C0E-9D7B-02AED9B0EF10}"/>
               </a:ext>
             </a:extLst>
           </p:cNvPr>
@@ -3474,7 +3579,7 @@
           <p:cNvPr id="3" name="Subtitle 2">
             <a:extLst>
               <a:ext uri="{FF2B5EF4-FFF2-40B4-BE49-F238E27FC236}">
-                <a16:creationId xmlns:a16="http://schemas.microsoft.com/office/drawing/2014/main" xmlns="" id="{2299AB8F-6EA0-4F46-A89D-CB847B3E1B12}"/>
+                <a16:creationId xmlns:a16="http://schemas.microsoft.com/office/drawing/2014/main" id="{2299AB8F-6EA0-4F46-A89D-CB847B3E1B12}"/>
               </a:ext>
             </a:extLst>
           </p:cNvPr>
@@ -3507,13 +3612,6 @@
   <p:clrMapOvr>
     <a:masterClrMapping/>
   </p:clrMapOvr>
-  <p:timing>
-    <p:tnLst>
-      <p:par>
-        <p:cTn id="1" dur="indefinite" restart="never" nodeType="tmRoot"/>
-      </p:par>
-    </p:tnLst>
-  </p:timing>
 </p:sld>
 </file>
 
@@ -3539,7 +3637,7 @@
           <p:cNvPr id="2" name="Title 1">
             <a:extLst>
               <a:ext uri="{FF2B5EF4-FFF2-40B4-BE49-F238E27FC236}">
-                <a16:creationId xmlns:a16="http://schemas.microsoft.com/office/drawing/2014/main" xmlns="" id="{A2C58B07-A1D4-4BF0-8FEE-C20DAA5690A1}"/>
+                <a16:creationId xmlns:a16="http://schemas.microsoft.com/office/drawing/2014/main" id="{A2C58B07-A1D4-4BF0-8FEE-C20DAA5690A1}"/>
               </a:ext>
             </a:extLst>
           </p:cNvPr>
@@ -3572,7 +3670,7 @@
           <p:cNvPr id="5" name="Content Placeholder 4">
             <a:extLst>
               <a:ext uri="{FF2B5EF4-FFF2-40B4-BE49-F238E27FC236}">
-                <a16:creationId xmlns:a16="http://schemas.microsoft.com/office/drawing/2014/main" xmlns="" id="{079287F6-5971-4B39-B17A-2E4CDA27C38A}"/>
+                <a16:creationId xmlns:a16="http://schemas.microsoft.com/office/drawing/2014/main" id="{079287F6-5971-4B39-B17A-2E4CDA27C38A}"/>
               </a:ext>
             </a:extLst>
           </p:cNvPr>
@@ -3601,7 +3699,7 @@
           <p:cNvPr id="7" name="Picture 6">
             <a:extLst>
               <a:ext uri="{FF2B5EF4-FFF2-40B4-BE49-F238E27FC236}">
-                <a16:creationId xmlns:a16="http://schemas.microsoft.com/office/drawing/2014/main" xmlns="" id="{F9D99DBA-6282-4B09-BBD6-26FC34D124F1}"/>
+                <a16:creationId xmlns:a16="http://schemas.microsoft.com/office/drawing/2014/main" id="{F9D99DBA-6282-4B09-BBD6-26FC34D124F1}"/>
               </a:ext>
             </a:extLst>
           </p:cNvPr>
@@ -3636,13 +3734,6 @@
   <p:clrMapOvr>
     <a:masterClrMapping/>
   </p:clrMapOvr>
-  <p:timing>
-    <p:tnLst>
-      <p:par>
-        <p:cTn id="1" dur="indefinite" restart="never" nodeType="tmRoot"/>
-      </p:par>
-    </p:tnLst>
-  </p:timing>
 </p:sld>
 </file>
 
@@ -3668,7 +3759,7 @@
           <p:cNvPr id="2" name="Title 1">
             <a:extLst>
               <a:ext uri="{FF2B5EF4-FFF2-40B4-BE49-F238E27FC236}">
-                <a16:creationId xmlns:a16="http://schemas.microsoft.com/office/drawing/2014/main" xmlns="" id="{C5D0DEA5-6C8E-4C39-A7DB-110DFAE5FFE5}"/>
+                <a16:creationId xmlns:a16="http://schemas.microsoft.com/office/drawing/2014/main" id="{C5D0DEA5-6C8E-4C39-A7DB-110DFAE5FFE5}"/>
               </a:ext>
             </a:extLst>
           </p:cNvPr>
@@ -3697,7 +3788,7 @@
           <p:cNvPr id="3" name="Content Placeholder 2">
             <a:extLst>
               <a:ext uri="{FF2B5EF4-FFF2-40B4-BE49-F238E27FC236}">
-                <a16:creationId xmlns:a16="http://schemas.microsoft.com/office/drawing/2014/main" xmlns="" id="{A8F024F9-5FFD-4484-8F1C-192C32BB304C}"/>
+                <a16:creationId xmlns:a16="http://schemas.microsoft.com/office/drawing/2014/main" id="{A8F024F9-5FFD-4484-8F1C-192C32BB304C}"/>
               </a:ext>
             </a:extLst>
           </p:cNvPr>
@@ -3715,19 +3806,19 @@
           <a:p>
             <a:r>
               <a:rPr lang="en-US" dirty="0"/>
-              <a:t>We discovered that regions experiencing weather extremes, crime patterns fluctuates dramatically when compared to regions with very standard weather. </a:t>
-            </a:r>
-          </a:p>
-          <a:p>
-            <a:r>
-              <a:rPr lang="en-US" dirty="0"/>
-              <a:t>Overall, when the weather is consistent, crime types remain consistent.  </a:t>
-            </a:r>
-          </a:p>
-          <a:p>
-            <a:r>
-              <a:rPr lang="en-US" dirty="0"/>
-              <a:t>Property and violent crimes were the most prevalent crime in Chicago, whereas Property and Disturbance crimes were most prevalent in Los Angeles. </a:t>
+              <a:t>We discovered that crime patters are more readily apparent in areas with varying weather extremes, versus areas where areas where weather is relatively steady. </a:t>
+            </a:r>
+          </a:p>
+          <a:p>
+            <a:r>
+              <a:rPr lang="en-US" dirty="0"/>
+              <a:t>Overall, when weather events are consistent, crime types remain consistent.  </a:t>
+            </a:r>
+          </a:p>
+          <a:p>
+            <a:r>
+              <a:rPr lang="en-US" dirty="0"/>
+              <a:t>Property and violent crimes were the most prevalent crimes in both Chicago and Los Angeles, but correlations were only visible with temperatures and not weather events. </a:t>
             </a:r>
           </a:p>
           <a:p>
@@ -3748,13 +3839,6 @@
   <p:clrMapOvr>
     <a:masterClrMapping/>
   </p:clrMapOvr>
-  <p:timing>
-    <p:tnLst>
-      <p:par>
-        <p:cTn id="1" dur="indefinite" restart="never" nodeType="tmRoot"/>
-      </p:par>
-    </p:tnLst>
-  </p:timing>
 </p:sld>
 </file>
 
@@ -3780,7 +3864,7 @@
           <p:cNvPr id="2" name="Title 1">
             <a:extLst>
               <a:ext uri="{FF2B5EF4-FFF2-40B4-BE49-F238E27FC236}">
-                <a16:creationId xmlns:a16="http://schemas.microsoft.com/office/drawing/2014/main" xmlns="" id="{D2101A1D-F2ED-490B-92EB-E220B3424EF7}"/>
+                <a16:creationId xmlns:a16="http://schemas.microsoft.com/office/drawing/2014/main" id="{D2101A1D-F2ED-490B-92EB-E220B3424EF7}"/>
               </a:ext>
             </a:extLst>
           </p:cNvPr>
@@ -3809,7 +3893,7 @@
           <p:cNvPr id="3" name="Content Placeholder 2">
             <a:extLst>
               <a:ext uri="{FF2B5EF4-FFF2-40B4-BE49-F238E27FC236}">
-                <a16:creationId xmlns:a16="http://schemas.microsoft.com/office/drawing/2014/main" xmlns="" id="{BBF4195B-AE3B-407A-8702-A1CEBE07D158}"/>
+                <a16:creationId xmlns:a16="http://schemas.microsoft.com/office/drawing/2014/main" id="{BBF4195B-AE3B-407A-8702-A1CEBE07D158}"/>
               </a:ext>
             </a:extLst>
           </p:cNvPr>
@@ -3934,13 +4018,6 @@
   <p:clrMapOvr>
     <a:masterClrMapping/>
   </p:clrMapOvr>
-  <p:timing>
-    <p:tnLst>
-      <p:par>
-        <p:cTn id="1" dur="indefinite" restart="never" nodeType="tmRoot"/>
-      </p:par>
-    </p:tnLst>
-  </p:timing>
 </p:sld>
 </file>
 
@@ -3966,7 +4043,7 @@
           <p:cNvPr id="2" name="Title 1">
             <a:extLst>
               <a:ext uri="{FF2B5EF4-FFF2-40B4-BE49-F238E27FC236}">
-                <a16:creationId xmlns:a16="http://schemas.microsoft.com/office/drawing/2014/main" xmlns="" id="{D2101A1D-F2ED-490B-92EB-E220B3424EF7}"/>
+                <a16:creationId xmlns:a16="http://schemas.microsoft.com/office/drawing/2014/main" id="{D2101A1D-F2ED-490B-92EB-E220B3424EF7}"/>
               </a:ext>
             </a:extLst>
           </p:cNvPr>
@@ -3995,7 +4072,7 @@
           <p:cNvPr id="3" name="Content Placeholder 2">
             <a:extLst>
               <a:ext uri="{FF2B5EF4-FFF2-40B4-BE49-F238E27FC236}">
-                <a16:creationId xmlns:a16="http://schemas.microsoft.com/office/drawing/2014/main" xmlns="" id="{BBF4195B-AE3B-407A-8702-A1CEBE07D158}"/>
+                <a16:creationId xmlns:a16="http://schemas.microsoft.com/office/drawing/2014/main" id="{BBF4195B-AE3B-407A-8702-A1CEBE07D158}"/>
               </a:ext>
             </a:extLst>
           </p:cNvPr>
@@ -4033,13 +4110,6 @@
   <p:clrMapOvr>
     <a:masterClrMapping/>
   </p:clrMapOvr>
-  <p:timing>
-    <p:tnLst>
-      <p:par>
-        <p:cTn id="1" dur="indefinite" restart="never" nodeType="tmRoot"/>
-      </p:par>
-    </p:tnLst>
-  </p:timing>
 </p:sld>
 </file>
 
@@ -4065,7 +4135,7 @@
           <p:cNvPr id="2" name="Title 1">
             <a:extLst>
               <a:ext uri="{FF2B5EF4-FFF2-40B4-BE49-F238E27FC236}">
-                <a16:creationId xmlns:a16="http://schemas.microsoft.com/office/drawing/2014/main" xmlns="" id="{48CB2E1E-F2CA-4BC0-B171-8A889E17F884}"/>
+                <a16:creationId xmlns:a16="http://schemas.microsoft.com/office/drawing/2014/main" id="{48CB2E1E-F2CA-4BC0-B171-8A889E17F884}"/>
               </a:ext>
             </a:extLst>
           </p:cNvPr>
@@ -4103,13 +4173,6 @@
   <p:clrMapOvr>
     <a:masterClrMapping/>
   </p:clrMapOvr>
-  <p:timing>
-    <p:tnLst>
-      <p:par>
-        <p:cTn id="1" dur="indefinite" restart="never" nodeType="tmRoot"/>
-      </p:par>
-    </p:tnLst>
-  </p:timing>
 </p:sld>
 </file>
 
@@ -4135,7 +4198,7 @@
           <p:cNvPr id="2" name="Title 1">
             <a:extLst>
               <a:ext uri="{FF2B5EF4-FFF2-40B4-BE49-F238E27FC236}">
-                <a16:creationId xmlns:a16="http://schemas.microsoft.com/office/drawing/2014/main" xmlns="" id="{83A7EC75-4101-420F-814F-26B068BEBD27}"/>
+                <a16:creationId xmlns:a16="http://schemas.microsoft.com/office/drawing/2014/main" id="{83A7EC75-4101-420F-814F-26B068BEBD27}"/>
               </a:ext>
             </a:extLst>
           </p:cNvPr>
@@ -4164,7 +4227,7 @@
           <p:cNvPr id="3" name="Content Placeholder 2">
             <a:extLst>
               <a:ext uri="{FF2B5EF4-FFF2-40B4-BE49-F238E27FC236}">
-                <a16:creationId xmlns:a16="http://schemas.microsoft.com/office/drawing/2014/main" xmlns="" id="{DC5ED40B-B2BF-4913-9615-4F583FC1595E}"/>
+                <a16:creationId xmlns:a16="http://schemas.microsoft.com/office/drawing/2014/main" id="{DC5ED40B-B2BF-4913-9615-4F583FC1595E}"/>
               </a:ext>
             </a:extLst>
           </p:cNvPr>
@@ -4237,13 +4300,6 @@
   <p:clrMapOvr>
     <a:masterClrMapping/>
   </p:clrMapOvr>
-  <p:timing>
-    <p:tnLst>
-      <p:par>
-        <p:cTn id="1" dur="indefinite" restart="never" nodeType="tmRoot"/>
-      </p:par>
-    </p:tnLst>
-  </p:timing>
 </p:sld>
 </file>
 
@@ -4269,7 +4325,7 @@
           <p:cNvPr id="2" name="Title 1">
             <a:extLst>
               <a:ext uri="{FF2B5EF4-FFF2-40B4-BE49-F238E27FC236}">
-                <a16:creationId xmlns:a16="http://schemas.microsoft.com/office/drawing/2014/main" xmlns="" id="{DA129FB1-B146-408B-A3F5-15F104F577F3}"/>
+                <a16:creationId xmlns:a16="http://schemas.microsoft.com/office/drawing/2014/main" id="{DA129FB1-B146-408B-A3F5-15F104F577F3}"/>
               </a:ext>
             </a:extLst>
           </p:cNvPr>
@@ -4298,7 +4354,7 @@
           <p:cNvPr id="3" name="Content Placeholder 2">
             <a:extLst>
               <a:ext uri="{FF2B5EF4-FFF2-40B4-BE49-F238E27FC236}">
-                <a16:creationId xmlns:a16="http://schemas.microsoft.com/office/drawing/2014/main" xmlns="" id="{A6FB94C6-3BF8-4FE5-8566-37B8EAD1F771}"/>
+                <a16:creationId xmlns:a16="http://schemas.microsoft.com/office/drawing/2014/main" id="{A6FB94C6-3BF8-4FE5-8566-37B8EAD1F771}"/>
               </a:ext>
             </a:extLst>
           </p:cNvPr>
@@ -4369,13 +4425,6 @@
   <p:clrMapOvr>
     <a:masterClrMapping/>
   </p:clrMapOvr>
-  <p:timing>
-    <p:tnLst>
-      <p:par>
-        <p:cTn id="1" dur="indefinite" restart="never" nodeType="tmRoot"/>
-      </p:par>
-    </p:tnLst>
-  </p:timing>
 </p:sld>
 </file>
 
@@ -4401,7 +4450,7 @@
           <p:cNvPr id="2" name="Title 1">
             <a:extLst>
               <a:ext uri="{FF2B5EF4-FFF2-40B4-BE49-F238E27FC236}">
-                <a16:creationId xmlns:a16="http://schemas.microsoft.com/office/drawing/2014/main" xmlns="" id="{F7BE1882-99BB-4365-A118-1C31F280A32D}"/>
+                <a16:creationId xmlns:a16="http://schemas.microsoft.com/office/drawing/2014/main" id="{F7BE1882-99BB-4365-A118-1C31F280A32D}"/>
               </a:ext>
             </a:extLst>
           </p:cNvPr>
@@ -4430,7 +4479,7 @@
           <p:cNvPr id="3" name="Content Placeholder 2">
             <a:extLst>
               <a:ext uri="{FF2B5EF4-FFF2-40B4-BE49-F238E27FC236}">
-                <a16:creationId xmlns:a16="http://schemas.microsoft.com/office/drawing/2014/main" xmlns="" id="{162D072F-1554-4A17-BEAC-B62E922B4D85}"/>
+                <a16:creationId xmlns:a16="http://schemas.microsoft.com/office/drawing/2014/main" id="{162D072F-1554-4A17-BEAC-B62E922B4D85}"/>
               </a:ext>
             </a:extLst>
           </p:cNvPr>
@@ -4485,13 +4534,6 @@
   <p:clrMapOvr>
     <a:masterClrMapping/>
   </p:clrMapOvr>
-  <p:timing>
-    <p:tnLst>
-      <p:par>
-        <p:cTn id="1" dur="indefinite" restart="never" nodeType="tmRoot"/>
-      </p:par>
-    </p:tnLst>
-  </p:timing>
 </p:sld>
 </file>
 
@@ -4517,7 +4559,7 @@
           <p:cNvPr id="2" name="Title 1">
             <a:extLst>
               <a:ext uri="{FF2B5EF4-FFF2-40B4-BE49-F238E27FC236}">
-                <a16:creationId xmlns:a16="http://schemas.microsoft.com/office/drawing/2014/main" xmlns="" id="{0F605016-C505-470E-B152-4100BA4DD519}"/>
+                <a16:creationId xmlns:a16="http://schemas.microsoft.com/office/drawing/2014/main" id="{0F605016-C505-470E-B152-4100BA4DD519}"/>
               </a:ext>
             </a:extLst>
           </p:cNvPr>
@@ -4546,7 +4588,7 @@
           <p:cNvPr id="3" name="Content Placeholder 2">
             <a:extLst>
               <a:ext uri="{FF2B5EF4-FFF2-40B4-BE49-F238E27FC236}">
-                <a16:creationId xmlns:a16="http://schemas.microsoft.com/office/drawing/2014/main" xmlns="" id="{BEE22DA4-9485-43B5-AA7C-37B594A52FF6}"/>
+                <a16:creationId xmlns:a16="http://schemas.microsoft.com/office/drawing/2014/main" id="{BEE22DA4-9485-43B5-AA7C-37B594A52FF6}"/>
               </a:ext>
             </a:extLst>
           </p:cNvPr>
@@ -4636,13 +4678,6 @@
   <p:clrMapOvr>
     <a:masterClrMapping/>
   </p:clrMapOvr>
-  <p:timing>
-    <p:tnLst>
-      <p:par>
-        <p:cTn id="1" dur="indefinite" restart="never" nodeType="tmRoot"/>
-      </p:par>
-    </p:tnLst>
-  </p:timing>
 </p:sld>
 </file>
 
@@ -4668,7 +4703,7 @@
           <p:cNvPr id="2" name="Title 1">
             <a:extLst>
               <a:ext uri="{FF2B5EF4-FFF2-40B4-BE49-F238E27FC236}">
-                <a16:creationId xmlns:a16="http://schemas.microsoft.com/office/drawing/2014/main" xmlns="" id="{D15D94E2-91C9-45B4-AD19-711A37265B03}"/>
+                <a16:creationId xmlns:a16="http://schemas.microsoft.com/office/drawing/2014/main" id="{D15D94E2-91C9-45B4-AD19-711A37265B03}"/>
               </a:ext>
             </a:extLst>
           </p:cNvPr>
@@ -4704,7 +4739,7 @@
           <p:cNvPr id="3" name="Content Placeholder 2">
             <a:extLst>
               <a:ext uri="{FF2B5EF4-FFF2-40B4-BE49-F238E27FC236}">
-                <a16:creationId xmlns:a16="http://schemas.microsoft.com/office/drawing/2014/main" xmlns="" id="{92E63922-716A-4669-8E46-96915F4D1083}"/>
+                <a16:creationId xmlns:a16="http://schemas.microsoft.com/office/drawing/2014/main" id="{92E63922-716A-4669-8E46-96915F4D1083}"/>
               </a:ext>
             </a:extLst>
           </p:cNvPr>
@@ -4743,13 +4778,6 @@
   <p:clrMapOvr>
     <a:masterClrMapping/>
   </p:clrMapOvr>
-  <p:timing>
-    <p:tnLst>
-      <p:par>
-        <p:cTn id="1" dur="indefinite" restart="never" nodeType="tmRoot"/>
-      </p:par>
-    </p:tnLst>
-  </p:timing>
 </p:sld>
 </file>
 
@@ -4775,7 +4803,7 @@
           <p:cNvPr id="2" name="Title 1">
             <a:extLst>
               <a:ext uri="{FF2B5EF4-FFF2-40B4-BE49-F238E27FC236}">
-                <a16:creationId xmlns:a16="http://schemas.microsoft.com/office/drawing/2014/main" xmlns="" id="{AAEBA6E1-5E63-4B00-9358-0B0FCBB9F43D}"/>
+                <a16:creationId xmlns:a16="http://schemas.microsoft.com/office/drawing/2014/main" id="{AAEBA6E1-5E63-4B00-9358-0B0FCBB9F43D}"/>
               </a:ext>
             </a:extLst>
           </p:cNvPr>
@@ -4798,10 +4826,6 @@
               <a:rPr lang="en-US" sz="3100" dirty="0"/>
               <a:t>Does weather affect crime incidence? Do crimes occur more often in areas experiencing extreme seasonal weather changes?</a:t>
             </a:r>
-            <a:r>
-              <a:rPr lang="en-US" dirty="0"/>
-              <a:t/>
-            </a:r>
             <a:br>
               <a:rPr lang="en-US" dirty="0"/>
             </a:br>
@@ -4811,10 +4835,10 @@
       </p:sp>
       <p:pic>
         <p:nvPicPr>
-          <p:cNvPr id="33" name="Content Placeholder 32">
+          <p:cNvPr id="9" name="Content Placeholder 8">
             <a:extLst>
               <a:ext uri="{FF2B5EF4-FFF2-40B4-BE49-F238E27FC236}">
-                <a16:creationId xmlns:a16="http://schemas.microsoft.com/office/drawing/2014/main" xmlns="" id="{B4EDC999-2F3E-47F4-B462-88BA6BDE808D}"/>
+                <a16:creationId xmlns:a16="http://schemas.microsoft.com/office/drawing/2014/main" id="{1ABB43A6-DC74-46A3-A26A-81C4F07F5319}"/>
               </a:ext>
             </a:extLst>
           </p:cNvPr>
@@ -4833,17 +4857,17 @@
         </p:blipFill>
         <p:spPr>
           <a:xfrm>
-            <a:off x="3452320" y="0"/>
-            <a:ext cx="4851708" cy="3440753"/>
+            <a:off x="3734354" y="669121"/>
+            <a:ext cx="3795740" cy="2652732"/>
           </a:xfrm>
         </p:spPr>
       </p:pic>
       <p:pic>
         <p:nvPicPr>
-          <p:cNvPr id="35" name="Picture 34">
+          <p:cNvPr id="11" name="Picture 10">
             <a:extLst>
               <a:ext uri="{FF2B5EF4-FFF2-40B4-BE49-F238E27FC236}">
-                <a16:creationId xmlns:a16="http://schemas.microsoft.com/office/drawing/2014/main" xmlns="" id="{7E4A5558-6A97-4E08-81A1-423D84DBA2D4}"/>
+                <a16:creationId xmlns:a16="http://schemas.microsoft.com/office/drawing/2014/main" id="{0B5EFD5A-E066-42A8-9883-5F4160D935AE}"/>
               </a:ext>
             </a:extLst>
           </p:cNvPr>
@@ -4860,82 +4884,74 @@
         </p:blipFill>
         <p:spPr>
           <a:xfrm>
-            <a:off x="6501834" y="3333776"/>
-            <a:ext cx="4979534" cy="3531405"/>
+            <a:off x="3734354" y="1013362"/>
+            <a:ext cx="3800503" cy="2662257"/>
           </a:xfrm>
           <a:prstGeom prst="rect">
             <a:avLst/>
           </a:prstGeom>
         </p:spPr>
       </p:pic>
-      <p:sp>
-        <p:nvSpPr>
-          <p:cNvPr id="5" name="Rectangle 4">
+      <p:pic>
+        <p:nvPicPr>
+          <p:cNvPr id="13" name="Picture 12">
             <a:extLst>
               <a:ext uri="{FF2B5EF4-FFF2-40B4-BE49-F238E27FC236}">
-                <a16:creationId xmlns:a16="http://schemas.microsoft.com/office/drawing/2014/main" xmlns="" id="{6BCF0038-16FE-4456-8F0D-B96341EA5130}"/>
+                <a16:creationId xmlns:a16="http://schemas.microsoft.com/office/drawing/2014/main" id="{4A14A518-A7CE-4A64-A94E-8F36AA6B108D}"/>
               </a:ext>
             </a:extLst>
           </p:cNvPr>
-          <p:cNvSpPr/>
+          <p:cNvPicPr>
+            <a:picLocks noChangeAspect="1"/>
+          </p:cNvPicPr>
           <p:nvPr/>
-        </p:nvSpPr>
+        </p:nvPicPr>
+        <p:blipFill>
+          <a:blip r:embed="rId4"/>
+          <a:stretch>
+            <a:fillRect/>
+          </a:stretch>
+        </p:blipFill>
         <p:spPr>
           <a:xfrm>
-            <a:off x="4209715" y="21946"/>
-            <a:ext cx="3900299" cy="236796"/>
+            <a:off x="7405892" y="3053238"/>
+            <a:ext cx="3819553" cy="2671782"/>
           </a:xfrm>
           <a:prstGeom prst="rect">
             <a:avLst/>
           </a:prstGeom>
-          <a:solidFill>
-            <a:schemeClr val="bg1"/>
-          </a:solidFill>
-          <a:ln>
-            <a:solidFill>
-              <a:schemeClr val="bg1"/>
-            </a:solidFill>
-          </a:ln>
         </p:spPr>
-        <p:style>
-          <a:lnRef idx="2">
-            <a:schemeClr val="accent1">
-              <a:shade val="50000"/>
-            </a:schemeClr>
-          </a:lnRef>
-          <a:fillRef idx="1">
-            <a:schemeClr val="accent1"/>
-          </a:fillRef>
-          <a:effectRef idx="0">
-            <a:schemeClr val="accent1"/>
-          </a:effectRef>
-          <a:fontRef idx="minor">
-            <a:schemeClr val="lt1"/>
-          </a:fontRef>
-        </p:style>
-        <p:txBody>
-          <a:bodyPr rtlCol="0" anchor="ctr"/>
-          <a:lstStyle/>
-          <a:p>
-            <a:pPr algn="ctr"/>
-            <a:r>
-              <a:rPr lang="en-US" sz="1400" dirty="0" smtClean="0">
-                <a:solidFill>
-                  <a:schemeClr val="tx1"/>
-                </a:solidFill>
-                <a:latin typeface="Calibri" panose="020F0502020204030204" pitchFamily="34" charset="0"/>
-              </a:rPr>
-              <a:t>LA: Crime Category v. Temp</a:t>
-            </a:r>
-            <a:endParaRPr lang="en-US" sz="1400" dirty="0">
-              <a:solidFill>
-                <a:schemeClr val="tx1"/>
-              </a:solidFill>
-              <a:latin typeface="Calibri" panose="020F0502020204030204" pitchFamily="34" charset="0"/>
-            </a:endParaRPr>
-          </a:p>
-        </p:txBody>
-      </p:sp>
+      </p:pic>
+      <p:pic>
+        <p:nvPicPr>
+          <p:cNvPr id="15" name="Picture 14">
+            <a:extLst>
+              <a:ext uri="{FF2B5EF4-FFF2-40B4-BE49-F238E27FC236}">
+                <a16:creationId xmlns:a16="http://schemas.microsoft.com/office/drawing/2014/main" id="{0AFB7337-485F-48F7-9DBD-4F8B2413609A}"/>
+              </a:ext>
+            </a:extLst>
+          </p:cNvPr>
+          <p:cNvPicPr>
+            <a:picLocks noChangeAspect="1"/>
+          </p:cNvPicPr>
+          <p:nvPr/>
+        </p:nvPicPr>
+        <p:blipFill>
+          <a:blip r:embed="rId5"/>
+          <a:stretch>
+            <a:fillRect/>
+          </a:stretch>
+        </p:blipFill>
+        <p:spPr>
+          <a:xfrm>
+            <a:off x="7530094" y="3675619"/>
+            <a:ext cx="3833841" cy="2690832"/>
+          </a:xfrm>
+          <a:prstGeom prst="rect">
+            <a:avLst/>
+          </a:prstGeom>
+        </p:spPr>
+      </p:pic>
     </p:spTree>
     <p:extLst>
       <p:ext uri="{BB962C8B-B14F-4D97-AF65-F5344CB8AC3E}">
@@ -4946,13 +4962,796 @@
   <p:clrMapOvr>
     <a:masterClrMapping/>
   </p:clrMapOvr>
-  <p:timing>
-    <p:tnLst>
-      <p:par>
-        <p:cTn id="1" dur="indefinite" restart="never" nodeType="tmRoot"/>
-      </p:par>
-    </p:tnLst>
-  </p:timing>
+  <mc:AlternateContent xmlns:mc="http://schemas.openxmlformats.org/markup-compatibility/2006">
+    <mc:Choice xmlns:p14="http://schemas.microsoft.com/office/powerpoint/2010/main" Requires="p14">
+      <p:timing>
+        <p:tnLst>
+          <p:par>
+            <p:cTn id="1" dur="indefinite" restart="never" nodeType="tmRoot">
+              <p:childTnLst>
+                <p:seq concurrent="1" nextAc="seek">
+                  <p:cTn id="2" dur="indefinite" nodeType="mainSeq">
+                    <p:childTnLst>
+                      <p:par>
+                        <p:cTn id="3" fill="hold">
+                          <p:stCondLst>
+                            <p:cond delay="indefinite"/>
+                          </p:stCondLst>
+                          <p:childTnLst>
+                            <p:par>
+                              <p:cTn id="4" fill="hold">
+                                <p:stCondLst>
+                                  <p:cond delay="0"/>
+                                </p:stCondLst>
+                                <p:childTnLst>
+                                  <p:par>
+                                    <p:cTn id="5" presetID="2" presetClass="entr" presetSubtype="4" fill="hold" nodeType="clickEffect" p14:presetBounceEnd="26000">
+                                      <p:stCondLst>
+                                        <p:cond delay="0"/>
+                                      </p:stCondLst>
+                                      <p:childTnLst>
+                                        <p:set>
+                                          <p:cBhvr>
+                                            <p:cTn id="6" dur="1" fill="hold">
+                                              <p:stCondLst>
+                                                <p:cond delay="0"/>
+                                              </p:stCondLst>
+                                            </p:cTn>
+                                            <p:tgtEl>
+                                              <p:spTgt spid="9"/>
+                                            </p:tgtEl>
+                                            <p:attrNameLst>
+                                              <p:attrName>style.visibility</p:attrName>
+                                            </p:attrNameLst>
+                                          </p:cBhvr>
+                                          <p:to>
+                                            <p:strVal val="visible"/>
+                                          </p:to>
+                                        </p:set>
+                                        <p:anim calcmode="lin" valueType="num" p14:bounceEnd="26000">
+                                          <p:cBhvr additive="base">
+                                            <p:cTn id="7" dur="500" fill="hold"/>
+                                            <p:tgtEl>
+                                              <p:spTgt spid="9"/>
+                                            </p:tgtEl>
+                                            <p:attrNameLst>
+                                              <p:attrName>ppt_x</p:attrName>
+                                            </p:attrNameLst>
+                                          </p:cBhvr>
+                                          <p:tavLst>
+                                            <p:tav tm="0">
+                                              <p:val>
+                                                <p:strVal val="#ppt_x"/>
+                                              </p:val>
+                                            </p:tav>
+                                            <p:tav tm="100000">
+                                              <p:val>
+                                                <p:strVal val="#ppt_x"/>
+                                              </p:val>
+                                            </p:tav>
+                                          </p:tavLst>
+                                        </p:anim>
+                                        <p:anim calcmode="lin" valueType="num" p14:bounceEnd="26000">
+                                          <p:cBhvr additive="base">
+                                            <p:cTn id="8" dur="500" fill="hold"/>
+                                            <p:tgtEl>
+                                              <p:spTgt spid="9"/>
+                                            </p:tgtEl>
+                                            <p:attrNameLst>
+                                              <p:attrName>ppt_y</p:attrName>
+                                            </p:attrNameLst>
+                                          </p:cBhvr>
+                                          <p:tavLst>
+                                            <p:tav tm="0">
+                                              <p:val>
+                                                <p:strVal val="1+#ppt_h/2"/>
+                                              </p:val>
+                                            </p:tav>
+                                            <p:tav tm="100000">
+                                              <p:val>
+                                                <p:strVal val="#ppt_y"/>
+                                              </p:val>
+                                            </p:tav>
+                                          </p:tavLst>
+                                        </p:anim>
+                                      </p:childTnLst>
+                                    </p:cTn>
+                                  </p:par>
+                                </p:childTnLst>
+                              </p:cTn>
+                            </p:par>
+                          </p:childTnLst>
+                        </p:cTn>
+                      </p:par>
+                      <p:par>
+                        <p:cTn id="9" fill="hold">
+                          <p:stCondLst>
+                            <p:cond delay="indefinite"/>
+                          </p:stCondLst>
+                          <p:childTnLst>
+                            <p:par>
+                              <p:cTn id="10" fill="hold">
+                                <p:stCondLst>
+                                  <p:cond delay="0"/>
+                                </p:stCondLst>
+                                <p:childTnLst>
+                                  <p:par>
+                                    <p:cTn id="11" presetID="1" presetClass="entr" presetSubtype="0" fill="hold" nodeType="clickEffect">
+                                      <p:stCondLst>
+                                        <p:cond delay="0"/>
+                                      </p:stCondLst>
+                                      <p:childTnLst>
+                                        <p:set>
+                                          <p:cBhvr>
+                                            <p:cTn id="12" dur="1" fill="hold">
+                                              <p:stCondLst>
+                                                <p:cond delay="0"/>
+                                              </p:stCondLst>
+                                            </p:cTn>
+                                            <p:tgtEl>
+                                              <p:spTgt spid="13"/>
+                                            </p:tgtEl>
+                                            <p:attrNameLst>
+                                              <p:attrName>style.visibility</p:attrName>
+                                            </p:attrNameLst>
+                                          </p:cBhvr>
+                                          <p:to>
+                                            <p:strVal val="visible"/>
+                                          </p:to>
+                                        </p:set>
+                                      </p:childTnLst>
+                                    </p:cTn>
+                                  </p:par>
+                                </p:childTnLst>
+                              </p:cTn>
+                            </p:par>
+                          </p:childTnLst>
+                        </p:cTn>
+                      </p:par>
+                      <p:par>
+                        <p:cTn id="13" fill="hold">
+                          <p:stCondLst>
+                            <p:cond delay="indefinite"/>
+                          </p:stCondLst>
+                          <p:childTnLst>
+                            <p:par>
+                              <p:cTn id="14" fill="hold">
+                                <p:stCondLst>
+                                  <p:cond delay="0"/>
+                                </p:stCondLst>
+                                <p:childTnLst>
+                                  <p:par>
+                                    <p:cTn id="15" presetID="1" presetClass="exit" presetSubtype="0" fill="hold" nodeType="clickEffect">
+                                      <p:stCondLst>
+                                        <p:cond delay="0"/>
+                                      </p:stCondLst>
+                                      <p:childTnLst>
+                                        <p:set>
+                                          <p:cBhvr>
+                                            <p:cTn id="16" dur="1" fill="hold">
+                                              <p:stCondLst>
+                                                <p:cond delay="0"/>
+                                              </p:stCondLst>
+                                            </p:cTn>
+                                            <p:tgtEl>
+                                              <p:spTgt spid="9"/>
+                                            </p:tgtEl>
+                                            <p:attrNameLst>
+                                              <p:attrName>style.visibility</p:attrName>
+                                            </p:attrNameLst>
+                                          </p:cBhvr>
+                                          <p:to>
+                                            <p:strVal val="hidden"/>
+                                          </p:to>
+                                        </p:set>
+                                      </p:childTnLst>
+                                    </p:cTn>
+                                  </p:par>
+                                </p:childTnLst>
+                              </p:cTn>
+                            </p:par>
+                          </p:childTnLst>
+                        </p:cTn>
+                      </p:par>
+                      <p:par>
+                        <p:cTn id="17" fill="hold">
+                          <p:stCondLst>
+                            <p:cond delay="indefinite"/>
+                          </p:stCondLst>
+                          <p:childTnLst>
+                            <p:par>
+                              <p:cTn id="18" fill="hold">
+                                <p:stCondLst>
+                                  <p:cond delay="0"/>
+                                </p:stCondLst>
+                                <p:childTnLst>
+                                  <p:par>
+                                    <p:cTn id="19" presetID="1" presetClass="exit" presetSubtype="0" fill="hold" nodeType="clickEffect">
+                                      <p:stCondLst>
+                                        <p:cond delay="0"/>
+                                      </p:stCondLst>
+                                      <p:childTnLst>
+                                        <p:set>
+                                          <p:cBhvr>
+                                            <p:cTn id="20" dur="1" fill="hold">
+                                              <p:stCondLst>
+                                                <p:cond delay="0"/>
+                                              </p:stCondLst>
+                                            </p:cTn>
+                                            <p:tgtEl>
+                                              <p:spTgt spid="13"/>
+                                            </p:tgtEl>
+                                            <p:attrNameLst>
+                                              <p:attrName>style.visibility</p:attrName>
+                                            </p:attrNameLst>
+                                          </p:cBhvr>
+                                          <p:to>
+                                            <p:strVal val="hidden"/>
+                                          </p:to>
+                                        </p:set>
+                                      </p:childTnLst>
+                                    </p:cTn>
+                                  </p:par>
+                                </p:childTnLst>
+                              </p:cTn>
+                            </p:par>
+                          </p:childTnLst>
+                        </p:cTn>
+                      </p:par>
+                      <p:par>
+                        <p:cTn id="21" fill="hold">
+                          <p:stCondLst>
+                            <p:cond delay="indefinite"/>
+                          </p:stCondLst>
+                          <p:childTnLst>
+                            <p:par>
+                              <p:cTn id="22" fill="hold">
+                                <p:stCondLst>
+                                  <p:cond delay="0"/>
+                                </p:stCondLst>
+                                <p:childTnLst>
+                                  <p:par>
+                                    <p:cTn id="23" presetID="2" presetClass="entr" presetSubtype="1" fill="hold" nodeType="clickEffect" p14:presetBounceEnd="26000">
+                                      <p:stCondLst>
+                                        <p:cond delay="0"/>
+                                      </p:stCondLst>
+                                      <p:childTnLst>
+                                        <p:set>
+                                          <p:cBhvr>
+                                            <p:cTn id="24" dur="1" fill="hold">
+                                              <p:stCondLst>
+                                                <p:cond delay="0"/>
+                                              </p:stCondLst>
+                                            </p:cTn>
+                                            <p:tgtEl>
+                                              <p:spTgt spid="11"/>
+                                            </p:tgtEl>
+                                            <p:attrNameLst>
+                                              <p:attrName>style.visibility</p:attrName>
+                                            </p:attrNameLst>
+                                          </p:cBhvr>
+                                          <p:to>
+                                            <p:strVal val="visible"/>
+                                          </p:to>
+                                        </p:set>
+                                        <p:anim calcmode="lin" valueType="num" p14:bounceEnd="26000">
+                                          <p:cBhvr additive="base">
+                                            <p:cTn id="25" dur="500" fill="hold"/>
+                                            <p:tgtEl>
+                                              <p:spTgt spid="11"/>
+                                            </p:tgtEl>
+                                            <p:attrNameLst>
+                                              <p:attrName>ppt_x</p:attrName>
+                                            </p:attrNameLst>
+                                          </p:cBhvr>
+                                          <p:tavLst>
+                                            <p:tav tm="0">
+                                              <p:val>
+                                                <p:strVal val="#ppt_x"/>
+                                              </p:val>
+                                            </p:tav>
+                                            <p:tav tm="100000">
+                                              <p:val>
+                                                <p:strVal val="#ppt_x"/>
+                                              </p:val>
+                                            </p:tav>
+                                          </p:tavLst>
+                                        </p:anim>
+                                        <p:anim calcmode="lin" valueType="num" p14:bounceEnd="26000">
+                                          <p:cBhvr additive="base">
+                                            <p:cTn id="26" dur="500" fill="hold"/>
+                                            <p:tgtEl>
+                                              <p:spTgt spid="11"/>
+                                            </p:tgtEl>
+                                            <p:attrNameLst>
+                                              <p:attrName>ppt_y</p:attrName>
+                                            </p:attrNameLst>
+                                          </p:cBhvr>
+                                          <p:tavLst>
+                                            <p:tav tm="0">
+                                              <p:val>
+                                                <p:strVal val="0-#ppt_h/2"/>
+                                              </p:val>
+                                            </p:tav>
+                                            <p:tav tm="100000">
+                                              <p:val>
+                                                <p:strVal val="#ppt_y"/>
+                                              </p:val>
+                                            </p:tav>
+                                          </p:tavLst>
+                                        </p:anim>
+                                      </p:childTnLst>
+                                    </p:cTn>
+                                  </p:par>
+                                </p:childTnLst>
+                              </p:cTn>
+                            </p:par>
+                          </p:childTnLst>
+                        </p:cTn>
+                      </p:par>
+                      <p:par>
+                        <p:cTn id="27" fill="hold">
+                          <p:stCondLst>
+                            <p:cond delay="indefinite"/>
+                          </p:stCondLst>
+                          <p:childTnLst>
+                            <p:par>
+                              <p:cTn id="28" fill="hold">
+                                <p:stCondLst>
+                                  <p:cond delay="0"/>
+                                </p:stCondLst>
+                                <p:childTnLst>
+                                  <p:par>
+                                    <p:cTn id="29" presetID="1" presetClass="entr" presetSubtype="0" fill="hold" nodeType="clickEffect">
+                                      <p:stCondLst>
+                                        <p:cond delay="0"/>
+                                      </p:stCondLst>
+                                      <p:childTnLst>
+                                        <p:set>
+                                          <p:cBhvr>
+                                            <p:cTn id="30" dur="1" fill="hold">
+                                              <p:stCondLst>
+                                                <p:cond delay="0"/>
+                                              </p:stCondLst>
+                                            </p:cTn>
+                                            <p:tgtEl>
+                                              <p:spTgt spid="15"/>
+                                            </p:tgtEl>
+                                            <p:attrNameLst>
+                                              <p:attrName>style.visibility</p:attrName>
+                                            </p:attrNameLst>
+                                          </p:cBhvr>
+                                          <p:to>
+                                            <p:strVal val="visible"/>
+                                          </p:to>
+                                        </p:set>
+                                      </p:childTnLst>
+                                    </p:cTn>
+                                  </p:par>
+                                </p:childTnLst>
+                              </p:cTn>
+                            </p:par>
+                          </p:childTnLst>
+                        </p:cTn>
+                      </p:par>
+                    </p:childTnLst>
+                  </p:cTn>
+                  <p:prevCondLst>
+                    <p:cond evt="onPrev" delay="0">
+                      <p:tgtEl>
+                        <p:sldTgt/>
+                      </p:tgtEl>
+                    </p:cond>
+                  </p:prevCondLst>
+                  <p:nextCondLst>
+                    <p:cond evt="onNext" delay="0">
+                      <p:tgtEl>
+                        <p:sldTgt/>
+                      </p:tgtEl>
+                    </p:cond>
+                  </p:nextCondLst>
+                </p:seq>
+              </p:childTnLst>
+            </p:cTn>
+          </p:par>
+        </p:tnLst>
+      </p:timing>
+    </mc:Choice>
+    <mc:Fallback>
+      <p:timing>
+        <p:tnLst>
+          <p:par>
+            <p:cTn id="1" dur="indefinite" restart="never" nodeType="tmRoot">
+              <p:childTnLst>
+                <p:seq concurrent="1" nextAc="seek">
+                  <p:cTn id="2" dur="indefinite" nodeType="mainSeq">
+                    <p:childTnLst>
+                      <p:par>
+                        <p:cTn id="3" fill="hold">
+                          <p:stCondLst>
+                            <p:cond delay="indefinite"/>
+                          </p:stCondLst>
+                          <p:childTnLst>
+                            <p:par>
+                              <p:cTn id="4" fill="hold">
+                                <p:stCondLst>
+                                  <p:cond delay="0"/>
+                                </p:stCondLst>
+                                <p:childTnLst>
+                                  <p:par>
+                                    <p:cTn id="5" presetID="2" presetClass="entr" presetSubtype="4" fill="hold" nodeType="clickEffect">
+                                      <p:stCondLst>
+                                        <p:cond delay="0"/>
+                                      </p:stCondLst>
+                                      <p:childTnLst>
+                                        <p:set>
+                                          <p:cBhvr>
+                                            <p:cTn id="6" dur="1" fill="hold">
+                                              <p:stCondLst>
+                                                <p:cond delay="0"/>
+                                              </p:stCondLst>
+                                            </p:cTn>
+                                            <p:tgtEl>
+                                              <p:spTgt spid="9"/>
+                                            </p:tgtEl>
+                                            <p:attrNameLst>
+                                              <p:attrName>style.visibility</p:attrName>
+                                            </p:attrNameLst>
+                                          </p:cBhvr>
+                                          <p:to>
+                                            <p:strVal val="visible"/>
+                                          </p:to>
+                                        </p:set>
+                                        <p:anim calcmode="lin" valueType="num">
+                                          <p:cBhvr additive="base">
+                                            <p:cTn id="7" dur="500" fill="hold"/>
+                                            <p:tgtEl>
+                                              <p:spTgt spid="9"/>
+                                            </p:tgtEl>
+                                            <p:attrNameLst>
+                                              <p:attrName>ppt_x</p:attrName>
+                                            </p:attrNameLst>
+                                          </p:cBhvr>
+                                          <p:tavLst>
+                                            <p:tav tm="0">
+                                              <p:val>
+                                                <p:strVal val="#ppt_x"/>
+                                              </p:val>
+                                            </p:tav>
+                                            <p:tav tm="100000">
+                                              <p:val>
+                                                <p:strVal val="#ppt_x"/>
+                                              </p:val>
+                                            </p:tav>
+                                          </p:tavLst>
+                                        </p:anim>
+                                        <p:anim calcmode="lin" valueType="num">
+                                          <p:cBhvr additive="base">
+                                            <p:cTn id="8" dur="500" fill="hold"/>
+                                            <p:tgtEl>
+                                              <p:spTgt spid="9"/>
+                                            </p:tgtEl>
+                                            <p:attrNameLst>
+                                              <p:attrName>ppt_y</p:attrName>
+                                            </p:attrNameLst>
+                                          </p:cBhvr>
+                                          <p:tavLst>
+                                            <p:tav tm="0">
+                                              <p:val>
+                                                <p:strVal val="1+#ppt_h/2"/>
+                                              </p:val>
+                                            </p:tav>
+                                            <p:tav tm="100000">
+                                              <p:val>
+                                                <p:strVal val="#ppt_y"/>
+                                              </p:val>
+                                            </p:tav>
+                                          </p:tavLst>
+                                        </p:anim>
+                                      </p:childTnLst>
+                                    </p:cTn>
+                                  </p:par>
+                                </p:childTnLst>
+                              </p:cTn>
+                            </p:par>
+                          </p:childTnLst>
+                        </p:cTn>
+                      </p:par>
+                      <p:par>
+                        <p:cTn id="9" fill="hold">
+                          <p:stCondLst>
+                            <p:cond delay="indefinite"/>
+                          </p:stCondLst>
+                          <p:childTnLst>
+                            <p:par>
+                              <p:cTn id="10" fill="hold">
+                                <p:stCondLst>
+                                  <p:cond delay="0"/>
+                                </p:stCondLst>
+                                <p:childTnLst>
+                                  <p:par>
+                                    <p:cTn id="11" presetID="1" presetClass="entr" presetSubtype="0" fill="hold" nodeType="clickEffect">
+                                      <p:stCondLst>
+                                        <p:cond delay="0"/>
+                                      </p:stCondLst>
+                                      <p:childTnLst>
+                                        <p:set>
+                                          <p:cBhvr>
+                                            <p:cTn id="12" dur="1" fill="hold">
+                                              <p:stCondLst>
+                                                <p:cond delay="0"/>
+                                              </p:stCondLst>
+                                            </p:cTn>
+                                            <p:tgtEl>
+                                              <p:spTgt spid="13"/>
+                                            </p:tgtEl>
+                                            <p:attrNameLst>
+                                              <p:attrName>style.visibility</p:attrName>
+                                            </p:attrNameLst>
+                                          </p:cBhvr>
+                                          <p:to>
+                                            <p:strVal val="visible"/>
+                                          </p:to>
+                                        </p:set>
+                                      </p:childTnLst>
+                                    </p:cTn>
+                                  </p:par>
+                                </p:childTnLst>
+                              </p:cTn>
+                            </p:par>
+                          </p:childTnLst>
+                        </p:cTn>
+                      </p:par>
+                      <p:par>
+                        <p:cTn id="13" fill="hold">
+                          <p:stCondLst>
+                            <p:cond delay="indefinite"/>
+                          </p:stCondLst>
+                          <p:childTnLst>
+                            <p:par>
+                              <p:cTn id="14" fill="hold">
+                                <p:stCondLst>
+                                  <p:cond delay="0"/>
+                                </p:stCondLst>
+                                <p:childTnLst>
+                                  <p:par>
+                                    <p:cTn id="15" presetID="1" presetClass="exit" presetSubtype="0" fill="hold" nodeType="clickEffect">
+                                      <p:stCondLst>
+                                        <p:cond delay="0"/>
+                                      </p:stCondLst>
+                                      <p:childTnLst>
+                                        <p:set>
+                                          <p:cBhvr>
+                                            <p:cTn id="16" dur="1" fill="hold">
+                                              <p:stCondLst>
+                                                <p:cond delay="0"/>
+                                              </p:stCondLst>
+                                            </p:cTn>
+                                            <p:tgtEl>
+                                              <p:spTgt spid="9"/>
+                                            </p:tgtEl>
+                                            <p:attrNameLst>
+                                              <p:attrName>style.visibility</p:attrName>
+                                            </p:attrNameLst>
+                                          </p:cBhvr>
+                                          <p:to>
+                                            <p:strVal val="hidden"/>
+                                          </p:to>
+                                        </p:set>
+                                      </p:childTnLst>
+                                    </p:cTn>
+                                  </p:par>
+                                </p:childTnLst>
+                              </p:cTn>
+                            </p:par>
+                          </p:childTnLst>
+                        </p:cTn>
+                      </p:par>
+                      <p:par>
+                        <p:cTn id="17" fill="hold">
+                          <p:stCondLst>
+                            <p:cond delay="indefinite"/>
+                          </p:stCondLst>
+                          <p:childTnLst>
+                            <p:par>
+                              <p:cTn id="18" fill="hold">
+                                <p:stCondLst>
+                                  <p:cond delay="0"/>
+                                </p:stCondLst>
+                                <p:childTnLst>
+                                  <p:par>
+                                    <p:cTn id="19" presetID="1" presetClass="exit" presetSubtype="0" fill="hold" nodeType="clickEffect">
+                                      <p:stCondLst>
+                                        <p:cond delay="0"/>
+                                      </p:stCondLst>
+                                      <p:childTnLst>
+                                        <p:set>
+                                          <p:cBhvr>
+                                            <p:cTn id="20" dur="1" fill="hold">
+                                              <p:stCondLst>
+                                                <p:cond delay="0"/>
+                                              </p:stCondLst>
+                                            </p:cTn>
+                                            <p:tgtEl>
+                                              <p:spTgt spid="13"/>
+                                            </p:tgtEl>
+                                            <p:attrNameLst>
+                                              <p:attrName>style.visibility</p:attrName>
+                                            </p:attrNameLst>
+                                          </p:cBhvr>
+                                          <p:to>
+                                            <p:strVal val="hidden"/>
+                                          </p:to>
+                                        </p:set>
+                                      </p:childTnLst>
+                                    </p:cTn>
+                                  </p:par>
+                                </p:childTnLst>
+                              </p:cTn>
+                            </p:par>
+                          </p:childTnLst>
+                        </p:cTn>
+                      </p:par>
+                      <p:par>
+                        <p:cTn id="21" fill="hold">
+                          <p:stCondLst>
+                            <p:cond delay="indefinite"/>
+                          </p:stCondLst>
+                          <p:childTnLst>
+                            <p:par>
+                              <p:cTn id="22" fill="hold">
+                                <p:stCondLst>
+                                  <p:cond delay="0"/>
+                                </p:stCondLst>
+                                <p:childTnLst>
+                                  <p:par>
+                                    <p:cTn id="23" presetID="2" presetClass="entr" presetSubtype="1" fill="hold" nodeType="clickEffect">
+                                      <p:stCondLst>
+                                        <p:cond delay="0"/>
+                                      </p:stCondLst>
+                                      <p:childTnLst>
+                                        <p:set>
+                                          <p:cBhvr>
+                                            <p:cTn id="24" dur="1" fill="hold">
+                                              <p:stCondLst>
+                                                <p:cond delay="0"/>
+                                              </p:stCondLst>
+                                            </p:cTn>
+                                            <p:tgtEl>
+                                              <p:spTgt spid="11"/>
+                                            </p:tgtEl>
+                                            <p:attrNameLst>
+                                              <p:attrName>style.visibility</p:attrName>
+                                            </p:attrNameLst>
+                                          </p:cBhvr>
+                                          <p:to>
+                                            <p:strVal val="visible"/>
+                                          </p:to>
+                                        </p:set>
+                                        <p:anim calcmode="lin" valueType="num">
+                                          <p:cBhvr additive="base">
+                                            <p:cTn id="25" dur="500" fill="hold"/>
+                                            <p:tgtEl>
+                                              <p:spTgt spid="11"/>
+                                            </p:tgtEl>
+                                            <p:attrNameLst>
+                                              <p:attrName>ppt_x</p:attrName>
+                                            </p:attrNameLst>
+                                          </p:cBhvr>
+                                          <p:tavLst>
+                                            <p:tav tm="0">
+                                              <p:val>
+                                                <p:strVal val="#ppt_x"/>
+                                              </p:val>
+                                            </p:tav>
+                                            <p:tav tm="100000">
+                                              <p:val>
+                                                <p:strVal val="#ppt_x"/>
+                                              </p:val>
+                                            </p:tav>
+                                          </p:tavLst>
+                                        </p:anim>
+                                        <p:anim calcmode="lin" valueType="num">
+                                          <p:cBhvr additive="base">
+                                            <p:cTn id="26" dur="500" fill="hold"/>
+                                            <p:tgtEl>
+                                              <p:spTgt spid="11"/>
+                                            </p:tgtEl>
+                                            <p:attrNameLst>
+                                              <p:attrName>ppt_y</p:attrName>
+                                            </p:attrNameLst>
+                                          </p:cBhvr>
+                                          <p:tavLst>
+                                            <p:tav tm="0">
+                                              <p:val>
+                                                <p:strVal val="0-#ppt_h/2"/>
+                                              </p:val>
+                                            </p:tav>
+                                            <p:tav tm="100000">
+                                              <p:val>
+                                                <p:strVal val="#ppt_y"/>
+                                              </p:val>
+                                            </p:tav>
+                                          </p:tavLst>
+                                        </p:anim>
+                                      </p:childTnLst>
+                                    </p:cTn>
+                                  </p:par>
+                                </p:childTnLst>
+                              </p:cTn>
+                            </p:par>
+                          </p:childTnLst>
+                        </p:cTn>
+                      </p:par>
+                      <p:par>
+                        <p:cTn id="27" fill="hold">
+                          <p:stCondLst>
+                            <p:cond delay="indefinite"/>
+                          </p:stCondLst>
+                          <p:childTnLst>
+                            <p:par>
+                              <p:cTn id="28" fill="hold">
+                                <p:stCondLst>
+                                  <p:cond delay="0"/>
+                                </p:stCondLst>
+                                <p:childTnLst>
+                                  <p:par>
+                                    <p:cTn id="29" presetID="1" presetClass="entr" presetSubtype="0" fill="hold" nodeType="clickEffect">
+                                      <p:stCondLst>
+                                        <p:cond delay="0"/>
+                                      </p:stCondLst>
+                                      <p:childTnLst>
+                                        <p:set>
+                                          <p:cBhvr>
+                                            <p:cTn id="30" dur="1" fill="hold">
+                                              <p:stCondLst>
+                                                <p:cond delay="0"/>
+                                              </p:stCondLst>
+                                            </p:cTn>
+                                            <p:tgtEl>
+                                              <p:spTgt spid="15"/>
+                                            </p:tgtEl>
+                                            <p:attrNameLst>
+                                              <p:attrName>style.visibility</p:attrName>
+                                            </p:attrNameLst>
+                                          </p:cBhvr>
+                                          <p:to>
+                                            <p:strVal val="visible"/>
+                                          </p:to>
+                                        </p:set>
+                                      </p:childTnLst>
+                                    </p:cTn>
+                                  </p:par>
+                                </p:childTnLst>
+                              </p:cTn>
+                            </p:par>
+                          </p:childTnLst>
+                        </p:cTn>
+                      </p:par>
+                    </p:childTnLst>
+                  </p:cTn>
+                  <p:prevCondLst>
+                    <p:cond evt="onPrev" delay="0">
+                      <p:tgtEl>
+                        <p:sldTgt/>
+                      </p:tgtEl>
+                    </p:cond>
+                  </p:prevCondLst>
+                  <p:nextCondLst>
+                    <p:cond evt="onNext" delay="0">
+                      <p:tgtEl>
+                        <p:sldTgt/>
+                      </p:tgtEl>
+                    </p:cond>
+                  </p:nextCondLst>
+                </p:seq>
+              </p:childTnLst>
+            </p:cTn>
+          </p:par>
+        </p:tnLst>
+      </p:timing>
+    </mc:Fallback>
+  </mc:AlternateContent>
 </p:sld>
 </file>
 
@@ -4978,7 +5777,7 @@
           <p:cNvPr id="2" name="Title 1">
             <a:extLst>
               <a:ext uri="{FF2B5EF4-FFF2-40B4-BE49-F238E27FC236}">
-                <a16:creationId xmlns:a16="http://schemas.microsoft.com/office/drawing/2014/main" xmlns="" id="{6B33C208-721D-4FB4-94B2-FD3E08DC28A8}"/>
+                <a16:creationId xmlns:a16="http://schemas.microsoft.com/office/drawing/2014/main" id="{6B33C208-721D-4FB4-94B2-FD3E08DC28A8}"/>
               </a:ext>
             </a:extLst>
           </p:cNvPr>
@@ -5011,7 +5810,7 @@
           <p:cNvPr id="6" name="Content Placeholder 5">
             <a:extLst>
               <a:ext uri="{FF2B5EF4-FFF2-40B4-BE49-F238E27FC236}">
-                <a16:creationId xmlns:a16="http://schemas.microsoft.com/office/drawing/2014/main" xmlns="" id="{703B6654-B732-46FC-943A-E79355B2C7D4}"/>
+                <a16:creationId xmlns:a16="http://schemas.microsoft.com/office/drawing/2014/main" id="{703B6654-B732-46FC-943A-E79355B2C7D4}"/>
               </a:ext>
             </a:extLst>
           </p:cNvPr>
@@ -5040,7 +5839,7 @@
           <p:cNvPr id="8" name="Picture 7">
             <a:extLst>
               <a:ext uri="{FF2B5EF4-FFF2-40B4-BE49-F238E27FC236}">
-                <a16:creationId xmlns:a16="http://schemas.microsoft.com/office/drawing/2014/main" xmlns="" id="{D0E3F868-886D-401A-818F-08F162FC7A14}"/>
+                <a16:creationId xmlns:a16="http://schemas.microsoft.com/office/drawing/2014/main" id="{D0E3F868-886D-401A-818F-08F162FC7A14}"/>
               </a:ext>
             </a:extLst>
           </p:cNvPr>
@@ -5070,7 +5869,7 @@
           <p:cNvPr id="3" name="Rectangle 2">
             <a:extLst>
               <a:ext uri="{FF2B5EF4-FFF2-40B4-BE49-F238E27FC236}">
-                <a16:creationId xmlns:a16="http://schemas.microsoft.com/office/drawing/2014/main" xmlns="" id="{6BCF0038-16FE-4456-8F0D-B96341EA5130}"/>
+                <a16:creationId xmlns:a16="http://schemas.microsoft.com/office/drawing/2014/main" id="{6BCF0038-16FE-4456-8F0D-B96341EA5130}"/>
               </a:ext>
             </a:extLst>
           </p:cNvPr>
@@ -5116,7 +5915,7 @@
           <a:p>
             <a:pPr algn="ctr"/>
             <a:r>
-              <a:rPr lang="en-US" sz="1200" dirty="0" smtClean="0">
+              <a:rPr lang="en-US" sz="1200" dirty="0">
                 <a:solidFill>
                   <a:schemeClr val="tx1"/>
                 </a:solidFill>
@@ -5131,19 +5930,6 @@
               </a:rPr>
               <a:t>2015                      2016                      2017</a:t>
             </a:r>
-            <a:endParaRPr lang="en-US" sz="1200" dirty="0">
-              <a:solidFill>
-                <a:schemeClr val="tx1"/>
-              </a:solidFill>
-              <a:effectLst>
-                <a:outerShdw blurRad="50800" dist="38100" dir="16200000" rotWithShape="0">
-                  <a:prstClr val="black">
-                    <a:alpha val="40000"/>
-                  </a:prstClr>
-                </a:outerShdw>
-              </a:effectLst>
-              <a:latin typeface="Calibri" panose="020F0502020204030204" pitchFamily="34" charset="0"/>
-            </a:endParaRPr>
           </a:p>
         </p:txBody>
       </p:sp>
@@ -5272,7 +6058,7 @@
           <p:cNvPr id="12" name="Content Placeholder 5">
             <a:extLst>
               <a:ext uri="{FF2B5EF4-FFF2-40B4-BE49-F238E27FC236}">
-                <a16:creationId xmlns:a16="http://schemas.microsoft.com/office/drawing/2014/main" xmlns="" id="{703B6654-B732-46FC-943A-E79355B2C7D4}"/>
+                <a16:creationId xmlns:a16="http://schemas.microsoft.com/office/drawing/2014/main" id="{703B6654-B732-46FC-943A-E79355B2C7D4}"/>
               </a:ext>
             </a:extLst>
           </p:cNvPr>
@@ -5388,13 +6174,6 @@
   <p:clrMapOvr>
     <a:masterClrMapping/>
   </p:clrMapOvr>
-  <p:timing>
-    <p:tnLst>
-      <p:par>
-        <p:cTn id="1" dur="indefinite" restart="never" nodeType="tmRoot"/>
-      </p:par>
-    </p:tnLst>
-  </p:timing>
 </p:sld>
 </file>
 
@@ -5420,7 +6199,7 @@
           <p:cNvPr id="2" name="Title 1">
             <a:extLst>
               <a:ext uri="{FF2B5EF4-FFF2-40B4-BE49-F238E27FC236}">
-                <a16:creationId xmlns:a16="http://schemas.microsoft.com/office/drawing/2014/main" xmlns="" id="{73BAE7B6-A2F1-4F3D-8F74-60E7CAF00247}"/>
+                <a16:creationId xmlns:a16="http://schemas.microsoft.com/office/drawing/2014/main" id="{73BAE7B6-A2F1-4F3D-8F74-60E7CAF00247}"/>
               </a:ext>
             </a:extLst>
           </p:cNvPr>
@@ -5453,7 +6232,7 @@
           <p:cNvPr id="5" name="Content Placeholder 4">
             <a:extLst>
               <a:ext uri="{FF2B5EF4-FFF2-40B4-BE49-F238E27FC236}">
-                <a16:creationId xmlns:a16="http://schemas.microsoft.com/office/drawing/2014/main" xmlns="" id="{24379F97-968F-4588-93B2-2063AAD4329A}"/>
+                <a16:creationId xmlns:a16="http://schemas.microsoft.com/office/drawing/2014/main" id="{24379F97-968F-4588-93B2-2063AAD4329A}"/>
               </a:ext>
             </a:extLst>
           </p:cNvPr>
@@ -5482,7 +6261,7 @@
           <p:cNvPr id="7" name="Picture 6">
             <a:extLst>
               <a:ext uri="{FF2B5EF4-FFF2-40B4-BE49-F238E27FC236}">
-                <a16:creationId xmlns:a16="http://schemas.microsoft.com/office/drawing/2014/main" xmlns="" id="{A737FF2D-4701-43AF-9DA3-4335C7B713D7}"/>
+                <a16:creationId xmlns:a16="http://schemas.microsoft.com/office/drawing/2014/main" id="{A737FF2D-4701-43AF-9DA3-4335C7B713D7}"/>
               </a:ext>
             </a:extLst>
           </p:cNvPr>
@@ -5517,13 +6296,6 @@
   <p:clrMapOvr>
     <a:masterClrMapping/>
   </p:clrMapOvr>
-  <p:timing>
-    <p:tnLst>
-      <p:par>
-        <p:cTn id="1" dur="indefinite" restart="never" nodeType="tmRoot"/>
-      </p:par>
-    </p:tnLst>
-  </p:timing>
 </p:sld>
 </file>
 
@@ -5752,7 +6524,7 @@
   <a:extraClrSchemeLst/>
   <a:extLst>
     <a:ext uri="{05A4C25C-085E-4340-85A3-A5531E510DB2}">
-      <thm15:themeFamily xmlns:thm15="http://schemas.microsoft.com/office/thememl/2012/main" xmlns="" name="Frame" id="{F226E7A2-7162-461C-9490-D27D9DC04E43}" vid="{629A0216-3BBD-45C0-B63F-2683BEA18F60}"/>
+      <thm15:themeFamily xmlns:thm15="http://schemas.microsoft.com/office/thememl/2012/main" name="Frame" id="{F226E7A2-7162-461C-9490-D27D9DC04E43}" vid="{629A0216-3BBD-45C0-B63F-2683BEA18F60}"/>
     </a:ext>
   </a:extLst>
 </a:theme>

</xml_diff>